<commit_message>
Updated Model and Storage Class Diagram
</commit_message>
<xml_diff>
--- a/docs/diagrams/ModelComponentClassDiagram.pptx
+++ b/docs/diagrams/ModelComponentClassDiagram.pptx
@@ -208,7 +208,7 @@
           <a:p>
             <a:fld id="{F5CC4B3F-88C1-4FFA-B1B6-F41C21DC6924}" type="datetimeFigureOut">
               <a:rPr lang="en-US" smtClean="0"/>
-              <a:t>1/1/18</a:t>
+              <a:t>4/8/2018</a:t>
             </a:fld>
             <a:endParaRPr lang="en-US"/>
           </a:p>
@@ -272,38 +272,37 @@
           <a:p>
             <a:pPr lvl="0"/>
             <a:r>
-              <a:rPr lang="en-US" smtClean="0"/>
+              <a:rPr lang="en-US"/>
               <a:t>Click to edit Master text styles</a:t>
             </a:r>
           </a:p>
           <a:p>
             <a:pPr lvl="1"/>
             <a:r>
-              <a:rPr lang="en-US" smtClean="0"/>
+              <a:rPr lang="en-US"/>
               <a:t>Second level</a:t>
             </a:r>
           </a:p>
           <a:p>
             <a:pPr lvl="2"/>
             <a:r>
-              <a:rPr lang="en-US" smtClean="0"/>
+              <a:rPr lang="en-US"/>
               <a:t>Third level</a:t>
             </a:r>
           </a:p>
           <a:p>
             <a:pPr lvl="3"/>
             <a:r>
-              <a:rPr lang="en-US" smtClean="0"/>
+              <a:rPr lang="en-US"/>
               <a:t>Fourth level</a:t>
             </a:r>
           </a:p>
           <a:p>
             <a:pPr lvl="4"/>
             <a:r>
-              <a:rPr lang="en-US" smtClean="0"/>
+              <a:rPr lang="en-US"/>
               <a:t>Fifth level</a:t>
             </a:r>
-            <a:endParaRPr lang="en-US"/>
           </a:p>
         </p:txBody>
       </p:sp>
@@ -514,10 +513,9 @@
           <a:lstStyle/>
           <a:p>
             <a:r>
-              <a:rPr lang="en-US" smtClean="0"/>
+              <a:rPr lang="en-US"/>
               <a:t>Click to edit Master title style</a:t>
             </a:r>
-            <a:endParaRPr lang="en-US"/>
           </a:p>
         </p:txBody>
       </p:sp>
@@ -633,10 +631,9 @@
           </a:lstStyle>
           <a:p>
             <a:r>
-              <a:rPr lang="en-US" smtClean="0"/>
+              <a:rPr lang="en-US"/>
               <a:t>Click to edit Master subtitle style</a:t>
             </a:r>
-            <a:endParaRPr lang="en-US"/>
           </a:p>
         </p:txBody>
       </p:sp>
@@ -657,7 +654,7 @@
           <a:p>
             <a:fld id="{78C97017-6FC3-485B-9764-EAC9E56C1D49}" type="datetimeFigureOut">
               <a:rPr lang="en-US" smtClean="0"/>
-              <a:t>1/1/18</a:t>
+              <a:t>4/8/2018</a:t>
             </a:fld>
             <a:endParaRPr lang="en-US"/>
           </a:p>
@@ -751,10 +748,9 @@
           <a:lstStyle/>
           <a:p>
             <a:r>
-              <a:rPr lang="en-US" smtClean="0"/>
+              <a:rPr lang="en-US"/>
               <a:t>Click to edit Master title style</a:t>
             </a:r>
-            <a:endParaRPr lang="en-US"/>
           </a:p>
         </p:txBody>
       </p:sp>
@@ -775,38 +771,37 @@
           <a:p>
             <a:pPr lvl="0"/>
             <a:r>
-              <a:rPr lang="en-US" smtClean="0"/>
+              <a:rPr lang="en-US"/>
               <a:t>Click to edit Master text styles</a:t>
             </a:r>
           </a:p>
           <a:p>
             <a:pPr lvl="1"/>
             <a:r>
-              <a:rPr lang="en-US" smtClean="0"/>
+              <a:rPr lang="en-US"/>
               <a:t>Second level</a:t>
             </a:r>
           </a:p>
           <a:p>
             <a:pPr lvl="2"/>
             <a:r>
-              <a:rPr lang="en-US" smtClean="0"/>
+              <a:rPr lang="en-US"/>
               <a:t>Third level</a:t>
             </a:r>
           </a:p>
           <a:p>
             <a:pPr lvl="3"/>
             <a:r>
-              <a:rPr lang="en-US" smtClean="0"/>
+              <a:rPr lang="en-US"/>
               <a:t>Fourth level</a:t>
             </a:r>
           </a:p>
           <a:p>
             <a:pPr lvl="4"/>
             <a:r>
-              <a:rPr lang="en-US" smtClean="0"/>
+              <a:rPr lang="en-US"/>
               <a:t>Fifth level</a:t>
             </a:r>
-            <a:endParaRPr lang="en-US"/>
           </a:p>
         </p:txBody>
       </p:sp>
@@ -827,7 +822,7 @@
           <a:p>
             <a:fld id="{78C97017-6FC3-485B-9764-EAC9E56C1D49}" type="datetimeFigureOut">
               <a:rPr lang="en-US" smtClean="0"/>
-              <a:t>1/1/18</a:t>
+              <a:t>4/8/2018</a:t>
             </a:fld>
             <a:endParaRPr lang="en-US"/>
           </a:p>
@@ -926,10 +921,9 @@
           <a:lstStyle/>
           <a:p>
             <a:r>
-              <a:rPr lang="en-US" smtClean="0"/>
+              <a:rPr lang="en-US"/>
               <a:t>Click to edit Master title style</a:t>
             </a:r>
-            <a:endParaRPr lang="en-US"/>
           </a:p>
         </p:txBody>
       </p:sp>
@@ -955,38 +949,37 @@
           <a:p>
             <a:pPr lvl="0"/>
             <a:r>
-              <a:rPr lang="en-US" smtClean="0"/>
+              <a:rPr lang="en-US"/>
               <a:t>Click to edit Master text styles</a:t>
             </a:r>
           </a:p>
           <a:p>
             <a:pPr lvl="1"/>
             <a:r>
-              <a:rPr lang="en-US" smtClean="0"/>
+              <a:rPr lang="en-US"/>
               <a:t>Second level</a:t>
             </a:r>
           </a:p>
           <a:p>
             <a:pPr lvl="2"/>
             <a:r>
-              <a:rPr lang="en-US" smtClean="0"/>
+              <a:rPr lang="en-US"/>
               <a:t>Third level</a:t>
             </a:r>
           </a:p>
           <a:p>
             <a:pPr lvl="3"/>
             <a:r>
-              <a:rPr lang="en-US" smtClean="0"/>
+              <a:rPr lang="en-US"/>
               <a:t>Fourth level</a:t>
             </a:r>
           </a:p>
           <a:p>
             <a:pPr lvl="4"/>
             <a:r>
-              <a:rPr lang="en-US" smtClean="0"/>
+              <a:rPr lang="en-US"/>
               <a:t>Fifth level</a:t>
             </a:r>
-            <a:endParaRPr lang="en-US"/>
           </a:p>
         </p:txBody>
       </p:sp>
@@ -1007,7 +1000,7 @@
           <a:p>
             <a:fld id="{78C97017-6FC3-485B-9764-EAC9E56C1D49}" type="datetimeFigureOut">
               <a:rPr lang="en-US" smtClean="0"/>
-              <a:t>1/1/18</a:t>
+              <a:t>4/8/2018</a:t>
             </a:fld>
             <a:endParaRPr lang="en-US"/>
           </a:p>
@@ -1101,10 +1094,9 @@
           <a:lstStyle/>
           <a:p>
             <a:r>
-              <a:rPr lang="en-US" smtClean="0"/>
+              <a:rPr lang="en-US"/>
               <a:t>Click to edit Master title style</a:t>
             </a:r>
-            <a:endParaRPr lang="en-US"/>
           </a:p>
         </p:txBody>
       </p:sp>
@@ -1125,38 +1117,37 @@
           <a:p>
             <a:pPr lvl="0"/>
             <a:r>
-              <a:rPr lang="en-US" smtClean="0"/>
+              <a:rPr lang="en-US"/>
               <a:t>Click to edit Master text styles</a:t>
             </a:r>
           </a:p>
           <a:p>
             <a:pPr lvl="1"/>
             <a:r>
-              <a:rPr lang="en-US" smtClean="0"/>
+              <a:rPr lang="en-US"/>
               <a:t>Second level</a:t>
             </a:r>
           </a:p>
           <a:p>
             <a:pPr lvl="2"/>
             <a:r>
-              <a:rPr lang="en-US" smtClean="0"/>
+              <a:rPr lang="en-US"/>
               <a:t>Third level</a:t>
             </a:r>
           </a:p>
           <a:p>
             <a:pPr lvl="3"/>
             <a:r>
-              <a:rPr lang="en-US" smtClean="0"/>
+              <a:rPr lang="en-US"/>
               <a:t>Fourth level</a:t>
             </a:r>
           </a:p>
           <a:p>
             <a:pPr lvl="4"/>
             <a:r>
-              <a:rPr lang="en-US" smtClean="0"/>
+              <a:rPr lang="en-US"/>
               <a:t>Fifth level</a:t>
             </a:r>
-            <a:endParaRPr lang="en-US"/>
           </a:p>
         </p:txBody>
       </p:sp>
@@ -1177,7 +1168,7 @@
           <a:p>
             <a:fld id="{78C97017-6FC3-485B-9764-EAC9E56C1D49}" type="datetimeFigureOut">
               <a:rPr lang="en-US" smtClean="0"/>
-              <a:t>1/1/18</a:t>
+              <a:t>4/8/2018</a:t>
             </a:fld>
             <a:endParaRPr lang="en-US"/>
           </a:p>
@@ -1280,10 +1271,9 @@
           </a:lstStyle>
           <a:p>
             <a:r>
-              <a:rPr lang="en-US" smtClean="0"/>
+              <a:rPr lang="en-US"/>
               <a:t>Click to edit Master title style</a:t>
             </a:r>
-            <a:endParaRPr lang="en-US"/>
           </a:p>
         </p:txBody>
       </p:sp>
@@ -1400,7 +1390,7 @@
           <a:p>
             <a:pPr lvl="0"/>
             <a:r>
-              <a:rPr lang="en-US" smtClean="0"/>
+              <a:rPr lang="en-US"/>
               <a:t>Click to edit Master text styles</a:t>
             </a:r>
           </a:p>
@@ -1423,7 +1413,7 @@
           <a:p>
             <a:fld id="{78C97017-6FC3-485B-9764-EAC9E56C1D49}" type="datetimeFigureOut">
               <a:rPr lang="en-US" smtClean="0"/>
-              <a:t>1/1/18</a:t>
+              <a:t>4/8/2018</a:t>
             </a:fld>
             <a:endParaRPr lang="en-US"/>
           </a:p>
@@ -1517,10 +1507,9 @@
           <a:lstStyle/>
           <a:p>
             <a:r>
-              <a:rPr lang="en-US" smtClean="0"/>
+              <a:rPr lang="en-US"/>
               <a:t>Click to edit Master title style</a:t>
             </a:r>
-            <a:endParaRPr lang="en-US"/>
           </a:p>
         </p:txBody>
       </p:sp>
@@ -1574,38 +1563,37 @@
           <a:p>
             <a:pPr lvl="0"/>
             <a:r>
-              <a:rPr lang="en-US" smtClean="0"/>
+              <a:rPr lang="en-US"/>
               <a:t>Click to edit Master text styles</a:t>
             </a:r>
           </a:p>
           <a:p>
             <a:pPr lvl="1"/>
             <a:r>
-              <a:rPr lang="en-US" smtClean="0"/>
+              <a:rPr lang="en-US"/>
               <a:t>Second level</a:t>
             </a:r>
           </a:p>
           <a:p>
             <a:pPr lvl="2"/>
             <a:r>
-              <a:rPr lang="en-US" smtClean="0"/>
+              <a:rPr lang="en-US"/>
               <a:t>Third level</a:t>
             </a:r>
           </a:p>
           <a:p>
             <a:pPr lvl="3"/>
             <a:r>
-              <a:rPr lang="en-US" smtClean="0"/>
+              <a:rPr lang="en-US"/>
               <a:t>Fourth level</a:t>
             </a:r>
           </a:p>
           <a:p>
             <a:pPr lvl="4"/>
             <a:r>
-              <a:rPr lang="en-US" smtClean="0"/>
+              <a:rPr lang="en-US"/>
               <a:t>Fifth level</a:t>
             </a:r>
-            <a:endParaRPr lang="en-US"/>
           </a:p>
         </p:txBody>
       </p:sp>
@@ -1659,38 +1647,37 @@
           <a:p>
             <a:pPr lvl="0"/>
             <a:r>
-              <a:rPr lang="en-US" smtClean="0"/>
+              <a:rPr lang="en-US"/>
               <a:t>Click to edit Master text styles</a:t>
             </a:r>
           </a:p>
           <a:p>
             <a:pPr lvl="1"/>
             <a:r>
-              <a:rPr lang="en-US" smtClean="0"/>
+              <a:rPr lang="en-US"/>
               <a:t>Second level</a:t>
             </a:r>
           </a:p>
           <a:p>
             <a:pPr lvl="2"/>
             <a:r>
-              <a:rPr lang="en-US" smtClean="0"/>
+              <a:rPr lang="en-US"/>
               <a:t>Third level</a:t>
             </a:r>
           </a:p>
           <a:p>
             <a:pPr lvl="3"/>
             <a:r>
-              <a:rPr lang="en-US" smtClean="0"/>
+              <a:rPr lang="en-US"/>
               <a:t>Fourth level</a:t>
             </a:r>
           </a:p>
           <a:p>
             <a:pPr lvl="4"/>
             <a:r>
-              <a:rPr lang="en-US" smtClean="0"/>
+              <a:rPr lang="en-US"/>
               <a:t>Fifth level</a:t>
             </a:r>
-            <a:endParaRPr lang="en-US"/>
           </a:p>
         </p:txBody>
       </p:sp>
@@ -1711,7 +1698,7 @@
           <a:p>
             <a:fld id="{78C97017-6FC3-485B-9764-EAC9E56C1D49}" type="datetimeFigureOut">
               <a:rPr lang="en-US" smtClean="0"/>
-              <a:t>1/1/18</a:t>
+              <a:t>4/8/2018</a:t>
             </a:fld>
             <a:endParaRPr lang="en-US"/>
           </a:p>
@@ -1809,10 +1796,9 @@
           </a:lstStyle>
           <a:p>
             <a:r>
-              <a:rPr lang="en-US" smtClean="0"/>
+              <a:rPr lang="en-US"/>
               <a:t>Click to edit Master title style</a:t>
             </a:r>
-            <a:endParaRPr lang="en-US"/>
           </a:p>
         </p:txBody>
       </p:sp>
@@ -1875,7 +1861,7 @@
           <a:p>
             <a:pPr lvl="0"/>
             <a:r>
-              <a:rPr lang="en-US" smtClean="0"/>
+              <a:rPr lang="en-US"/>
               <a:t>Click to edit Master text styles</a:t>
             </a:r>
           </a:p>
@@ -1931,38 +1917,37 @@
           <a:p>
             <a:pPr lvl="0"/>
             <a:r>
-              <a:rPr lang="en-US" smtClean="0"/>
+              <a:rPr lang="en-US"/>
               <a:t>Click to edit Master text styles</a:t>
             </a:r>
           </a:p>
           <a:p>
             <a:pPr lvl="1"/>
             <a:r>
-              <a:rPr lang="en-US" smtClean="0"/>
+              <a:rPr lang="en-US"/>
               <a:t>Second level</a:t>
             </a:r>
           </a:p>
           <a:p>
             <a:pPr lvl="2"/>
             <a:r>
-              <a:rPr lang="en-US" smtClean="0"/>
+              <a:rPr lang="en-US"/>
               <a:t>Third level</a:t>
             </a:r>
           </a:p>
           <a:p>
             <a:pPr lvl="3"/>
             <a:r>
-              <a:rPr lang="en-US" smtClean="0"/>
+              <a:rPr lang="en-US"/>
               <a:t>Fourth level</a:t>
             </a:r>
           </a:p>
           <a:p>
             <a:pPr lvl="4"/>
             <a:r>
-              <a:rPr lang="en-US" smtClean="0"/>
+              <a:rPr lang="en-US"/>
               <a:t>Fifth level</a:t>
             </a:r>
-            <a:endParaRPr lang="en-US"/>
           </a:p>
         </p:txBody>
       </p:sp>
@@ -2025,7 +2010,7 @@
           <a:p>
             <a:pPr lvl="0"/>
             <a:r>
-              <a:rPr lang="en-US" smtClean="0"/>
+              <a:rPr lang="en-US"/>
               <a:t>Click to edit Master text styles</a:t>
             </a:r>
           </a:p>
@@ -2081,38 +2066,37 @@
           <a:p>
             <a:pPr lvl="0"/>
             <a:r>
-              <a:rPr lang="en-US" smtClean="0"/>
+              <a:rPr lang="en-US"/>
               <a:t>Click to edit Master text styles</a:t>
             </a:r>
           </a:p>
           <a:p>
             <a:pPr lvl="1"/>
             <a:r>
-              <a:rPr lang="en-US" smtClean="0"/>
+              <a:rPr lang="en-US"/>
               <a:t>Second level</a:t>
             </a:r>
           </a:p>
           <a:p>
             <a:pPr lvl="2"/>
             <a:r>
-              <a:rPr lang="en-US" smtClean="0"/>
+              <a:rPr lang="en-US"/>
               <a:t>Third level</a:t>
             </a:r>
           </a:p>
           <a:p>
             <a:pPr lvl="3"/>
             <a:r>
-              <a:rPr lang="en-US" smtClean="0"/>
+              <a:rPr lang="en-US"/>
               <a:t>Fourth level</a:t>
             </a:r>
           </a:p>
           <a:p>
             <a:pPr lvl="4"/>
             <a:r>
-              <a:rPr lang="en-US" smtClean="0"/>
+              <a:rPr lang="en-US"/>
               <a:t>Fifth level</a:t>
             </a:r>
-            <a:endParaRPr lang="en-US"/>
           </a:p>
         </p:txBody>
       </p:sp>
@@ -2133,7 +2117,7 @@
           <a:p>
             <a:fld id="{78C97017-6FC3-485B-9764-EAC9E56C1D49}" type="datetimeFigureOut">
               <a:rPr lang="en-US" smtClean="0"/>
-              <a:t>1/1/18</a:t>
+              <a:t>4/8/2018</a:t>
             </a:fld>
             <a:endParaRPr lang="en-US"/>
           </a:p>
@@ -2227,10 +2211,9 @@
           <a:lstStyle/>
           <a:p>
             <a:r>
-              <a:rPr lang="en-US" smtClean="0"/>
+              <a:rPr lang="en-US"/>
               <a:t>Click to edit Master title style</a:t>
             </a:r>
-            <a:endParaRPr lang="en-US"/>
           </a:p>
         </p:txBody>
       </p:sp>
@@ -2251,7 +2234,7 @@
           <a:p>
             <a:fld id="{78C97017-6FC3-485B-9764-EAC9E56C1D49}" type="datetimeFigureOut">
               <a:rPr lang="en-US" smtClean="0"/>
-              <a:t>1/1/18</a:t>
+              <a:t>4/8/2018</a:t>
             </a:fld>
             <a:endParaRPr lang="en-US"/>
           </a:p>
@@ -2346,7 +2329,7 @@
           <a:p>
             <a:fld id="{78C97017-6FC3-485B-9764-EAC9E56C1D49}" type="datetimeFigureOut">
               <a:rPr lang="en-US" smtClean="0"/>
-              <a:t>1/1/18</a:t>
+              <a:t>4/8/2018</a:t>
             </a:fld>
             <a:endParaRPr lang="en-US"/>
           </a:p>
@@ -2449,10 +2432,9 @@
           </a:lstStyle>
           <a:p>
             <a:r>
-              <a:rPr lang="en-US" smtClean="0"/>
+              <a:rPr lang="en-US"/>
               <a:t>Click to edit Master title style</a:t>
             </a:r>
-            <a:endParaRPr lang="en-US"/>
           </a:p>
         </p:txBody>
       </p:sp>
@@ -2506,38 +2488,37 @@
           <a:p>
             <a:pPr lvl="0"/>
             <a:r>
-              <a:rPr lang="en-US" smtClean="0"/>
+              <a:rPr lang="en-US"/>
               <a:t>Click to edit Master text styles</a:t>
             </a:r>
           </a:p>
           <a:p>
             <a:pPr lvl="1"/>
             <a:r>
-              <a:rPr lang="en-US" smtClean="0"/>
+              <a:rPr lang="en-US"/>
               <a:t>Second level</a:t>
             </a:r>
           </a:p>
           <a:p>
             <a:pPr lvl="2"/>
             <a:r>
-              <a:rPr lang="en-US" smtClean="0"/>
+              <a:rPr lang="en-US"/>
               <a:t>Third level</a:t>
             </a:r>
           </a:p>
           <a:p>
             <a:pPr lvl="3"/>
             <a:r>
-              <a:rPr lang="en-US" smtClean="0"/>
+              <a:rPr lang="en-US"/>
               <a:t>Fourth level</a:t>
             </a:r>
           </a:p>
           <a:p>
             <a:pPr lvl="4"/>
             <a:r>
-              <a:rPr lang="en-US" smtClean="0"/>
+              <a:rPr lang="en-US"/>
               <a:t>Fifth level</a:t>
             </a:r>
-            <a:endParaRPr lang="en-US"/>
           </a:p>
         </p:txBody>
       </p:sp>
@@ -2600,7 +2581,7 @@
           <a:p>
             <a:pPr lvl="0"/>
             <a:r>
-              <a:rPr lang="en-US" smtClean="0"/>
+              <a:rPr lang="en-US"/>
               <a:t>Click to edit Master text styles</a:t>
             </a:r>
           </a:p>
@@ -2623,7 +2604,7 @@
           <a:p>
             <a:fld id="{78C97017-6FC3-485B-9764-EAC9E56C1D49}" type="datetimeFigureOut">
               <a:rPr lang="en-US" smtClean="0"/>
-              <a:t>1/1/18</a:t>
+              <a:t>4/8/2018</a:t>
             </a:fld>
             <a:endParaRPr lang="en-US"/>
           </a:p>
@@ -2726,10 +2707,9 @@
           </a:lstStyle>
           <a:p>
             <a:r>
-              <a:rPr lang="en-US" smtClean="0"/>
+              <a:rPr lang="en-US"/>
               <a:t>Click to edit Master title style</a:t>
             </a:r>
-            <a:endParaRPr lang="en-US"/>
           </a:p>
         </p:txBody>
       </p:sp>
@@ -2853,7 +2833,7 @@
           <a:p>
             <a:pPr lvl="0"/>
             <a:r>
-              <a:rPr lang="en-US" smtClean="0"/>
+              <a:rPr lang="en-US"/>
               <a:t>Click to edit Master text styles</a:t>
             </a:r>
           </a:p>
@@ -2876,7 +2856,7 @@
           <a:p>
             <a:fld id="{78C97017-6FC3-485B-9764-EAC9E56C1D49}" type="datetimeFigureOut">
               <a:rPr lang="en-US" smtClean="0"/>
-              <a:t>1/1/18</a:t>
+              <a:t>4/8/2018</a:t>
             </a:fld>
             <a:endParaRPr lang="en-US"/>
           </a:p>
@@ -2985,10 +2965,9 @@
           <a:lstStyle/>
           <a:p>
             <a:r>
-              <a:rPr lang="en-US" smtClean="0"/>
+              <a:rPr lang="en-US"/>
               <a:t>Click to edit Master title style</a:t>
             </a:r>
-            <a:endParaRPr lang="en-US"/>
           </a:p>
         </p:txBody>
       </p:sp>
@@ -3019,38 +2998,37 @@
           <a:p>
             <a:pPr lvl="0"/>
             <a:r>
-              <a:rPr lang="en-US" smtClean="0"/>
+              <a:rPr lang="en-US"/>
               <a:t>Click to edit Master text styles</a:t>
             </a:r>
           </a:p>
           <a:p>
             <a:pPr lvl="1"/>
             <a:r>
-              <a:rPr lang="en-US" smtClean="0"/>
+              <a:rPr lang="en-US"/>
               <a:t>Second level</a:t>
             </a:r>
           </a:p>
           <a:p>
             <a:pPr lvl="2"/>
             <a:r>
-              <a:rPr lang="en-US" smtClean="0"/>
+              <a:rPr lang="en-US"/>
               <a:t>Third level</a:t>
             </a:r>
           </a:p>
           <a:p>
             <a:pPr lvl="3"/>
             <a:r>
-              <a:rPr lang="en-US" smtClean="0"/>
+              <a:rPr lang="en-US"/>
               <a:t>Fourth level</a:t>
             </a:r>
           </a:p>
           <a:p>
             <a:pPr lvl="4"/>
             <a:r>
-              <a:rPr lang="en-US" smtClean="0"/>
+              <a:rPr lang="en-US"/>
               <a:t>Fifth level</a:t>
             </a:r>
-            <a:endParaRPr lang="en-US"/>
           </a:p>
         </p:txBody>
       </p:sp>
@@ -3089,7 +3067,7 @@
           <a:p>
             <a:fld id="{78C97017-6FC3-485B-9764-EAC9E56C1D49}" type="datetimeFigureOut">
               <a:rPr lang="en-US" smtClean="0"/>
-              <a:t>1/1/18</a:t>
+              <a:t>4/8/2018</a:t>
             </a:fld>
             <a:endParaRPr lang="en-US"/>
           </a:p>
@@ -3472,8 +3450,8 @@
         </p:nvSpPr>
         <p:spPr>
           <a:xfrm>
-            <a:off x="1119865" y="1727200"/>
-            <a:ext cx="7490735" cy="2997200"/>
+            <a:off x="723417" y="685800"/>
+            <a:ext cx="7887183" cy="4038600"/>
           </a:xfrm>
           <a:prstGeom prst="roundRect">
             <a:avLst>
@@ -3510,7 +3488,7 @@
           <a:lstStyle/>
           <a:p>
             <a:r>
-              <a:rPr lang="en-US" sz="1200" b="1" dirty="0" smtClean="0">
+              <a:rPr lang="en-US" sz="1200" b="1" dirty="0">
                 <a:solidFill>
                   <a:srgbClr val="7030A0"/>
                 </a:solidFill>
@@ -3533,7 +3511,7 @@
         </p:nvSpPr>
         <p:spPr>
           <a:xfrm>
-            <a:off x="2877180" y="3158440"/>
+            <a:off x="2490657" y="2249471"/>
             <a:ext cx="1093635" cy="346760"/>
           </a:xfrm>
           <a:prstGeom prst="rect">
@@ -3569,7 +3547,7 @@
           <a:p>
             <a:pPr algn="ctr"/>
             <a:r>
-              <a:rPr lang="en-US" sz="1050" dirty="0" err="1" smtClean="0">
+              <a:rPr lang="en-US" sz="1050" dirty="0" err="1">
                 <a:solidFill>
                   <a:schemeClr val="bg1"/>
                 </a:solidFill>
@@ -3592,7 +3570,7 @@
         </p:nvSpPr>
         <p:spPr>
           <a:xfrm rot="16200000">
-            <a:off x="1683963" y="2868687"/>
+            <a:off x="1297440" y="1959718"/>
             <a:ext cx="1093635" cy="346760"/>
           </a:xfrm>
           <a:prstGeom prst="rect">
@@ -3628,7 +3606,7 @@
           <a:p>
             <a:pPr algn="ctr"/>
             <a:r>
-              <a:rPr lang="en-US" sz="1050" dirty="0" err="1" smtClean="0">
+              <a:rPr lang="en-US" sz="1050" dirty="0" err="1">
                 <a:solidFill>
                   <a:schemeClr val="bg1"/>
                 </a:solidFill>
@@ -3647,20 +3625,18 @@
         <p:nvCxnSpPr>
           <p:cNvPr id="107" name="Elbow Connector 106"/>
           <p:cNvCxnSpPr>
-            <a:stCxn id="9" idx="1"/>
+            <a:cxnSpLocks/>
+            <a:stCxn id="9" idx="3"/>
           </p:cNvCxnSpPr>
           <p:nvPr/>
         </p:nvCxnSpPr>
         <p:spPr>
           <a:xfrm rot="5400000" flipH="1" flipV="1">
-            <a:off x="4360065" y="1080909"/>
-            <a:ext cx="378691" cy="4637261"/>
-          </a:xfrm>
-          <a:prstGeom prst="bentConnector4">
-            <a:avLst>
-              <a:gd name="adj1" fmla="val -101829"/>
-              <a:gd name="adj2" fmla="val 99976"/>
-            </a:avLst>
+            <a:off x="3767373" y="-1144229"/>
+            <a:ext cx="807395" cy="4653627"/>
+          </a:xfrm>
+          <a:prstGeom prst="bentConnector2">
+            <a:avLst/>
           </a:prstGeom>
           <a:ln w="19050">
             <a:solidFill>
@@ -3668,7 +3644,7 @@
             </a:solidFill>
             <a:prstDash val="solid"/>
             <a:headEnd type="none" w="med" len="med"/>
-            <a:tailEnd type="arrow" w="med" len="med"/>
+            <a:tailEnd type="none" w="med" len="med"/>
           </a:ln>
           <a:effectLst/>
         </p:spPr>
@@ -3695,7 +3671,7 @@
         </p:nvSpPr>
         <p:spPr>
           <a:xfrm rot="16200000">
-            <a:off x="956202" y="2861202"/>
+            <a:off x="569679" y="1952233"/>
             <a:ext cx="1093635" cy="346760"/>
           </a:xfrm>
           <a:prstGeom prst="rect">
@@ -3742,7 +3718,7 @@
           <a:p>
             <a:pPr algn="ctr"/>
             <a:r>
-              <a:rPr lang="en-US" sz="1050" dirty="0" smtClean="0">
+              <a:rPr lang="en-US" sz="1050" dirty="0">
                 <a:solidFill>
                   <a:schemeClr val="bg1"/>
                 </a:solidFill>
@@ -3765,7 +3741,7 @@
         </p:nvSpPr>
         <p:spPr>
           <a:xfrm rot="16200000">
-            <a:off x="1626910" y="2952291"/>
+            <a:off x="1240387" y="2043322"/>
             <a:ext cx="270504" cy="175523"/>
           </a:xfrm>
           <a:prstGeom prst="triangle">
@@ -3815,7 +3791,7 @@
         </p:nvCxnSpPr>
         <p:spPr>
           <a:xfrm>
-            <a:off x="2656370" y="3326536"/>
+            <a:off x="2269847" y="2417567"/>
             <a:ext cx="220810" cy="5284"/>
           </a:xfrm>
           <a:prstGeom prst="straightConnector1">
@@ -3853,7 +3829,7 @@
         </p:nvCxnSpPr>
         <p:spPr>
           <a:xfrm>
-            <a:off x="910091" y="3040053"/>
+            <a:off x="523568" y="2131084"/>
             <a:ext cx="419548" cy="2860"/>
           </a:xfrm>
           <a:prstGeom prst="bentConnector3">
@@ -3898,7 +3874,7 @@
         </p:nvCxnSpPr>
         <p:spPr>
           <a:xfrm flipV="1">
-            <a:off x="1849924" y="3040052"/>
+            <a:off x="1463401" y="2131083"/>
             <a:ext cx="216105" cy="1"/>
           </a:xfrm>
           <a:prstGeom prst="line">
@@ -3937,7 +3913,7 @@
         </p:nvSpPr>
         <p:spPr>
           <a:xfrm>
-            <a:off x="2420322" y="3239846"/>
+            <a:off x="2033799" y="2330877"/>
             <a:ext cx="236048" cy="173380"/>
           </a:xfrm>
           <a:prstGeom prst="flowChartDecision">
@@ -3982,7 +3958,7 @@
         </p:nvSpPr>
         <p:spPr>
           <a:xfrm>
-            <a:off x="2879490" y="2627420"/>
+            <a:off x="2492967" y="1718451"/>
             <a:ext cx="1093635" cy="346760"/>
           </a:xfrm>
           <a:prstGeom prst="rect">
@@ -4015,7 +3991,7 @@
           <a:p>
             <a:pPr algn="ctr"/>
             <a:r>
-              <a:rPr lang="en-US" sz="1050" dirty="0" err="1" smtClean="0">
+              <a:rPr lang="en-US" sz="1050" dirty="0" err="1">
                 <a:solidFill>
                   <a:srgbClr val="7030A0"/>
                 </a:solidFill>
@@ -4041,7 +4017,7 @@
         </p:nvCxnSpPr>
         <p:spPr>
           <a:xfrm>
-            <a:off x="2658680" y="2795516"/>
+            <a:off x="2272157" y="1886547"/>
             <a:ext cx="220810" cy="5284"/>
           </a:xfrm>
           <a:prstGeom prst="straightConnector1">
@@ -4079,7 +4055,7 @@
         </p:nvSpPr>
         <p:spPr>
           <a:xfrm>
-            <a:off x="2422632" y="2708826"/>
+            <a:off x="2036109" y="1799857"/>
             <a:ext cx="236048" cy="173380"/>
           </a:xfrm>
           <a:prstGeom prst="flowChartDecision">
@@ -4124,7 +4100,7 @@
         </p:nvSpPr>
         <p:spPr>
           <a:xfrm>
-            <a:off x="4487017" y="2847371"/>
+            <a:off x="4100494" y="1938402"/>
             <a:ext cx="1156969" cy="346760"/>
           </a:xfrm>
           <a:prstGeom prst="rect">
@@ -4157,7 +4133,7 @@
           <a:p>
             <a:pPr algn="ctr"/>
             <a:r>
-              <a:rPr lang="en-US" sz="1050" dirty="0" err="1" smtClean="0">
+              <a:rPr lang="en-US" sz="1050" dirty="0" err="1">
                 <a:solidFill>
                   <a:srgbClr val="7030A0"/>
                 </a:solidFill>
@@ -4180,7 +4156,7 @@
         </p:nvSpPr>
         <p:spPr>
           <a:xfrm>
-            <a:off x="3984303" y="2673991"/>
+            <a:off x="3597780" y="1765022"/>
             <a:ext cx="236048" cy="173380"/>
           </a:xfrm>
           <a:prstGeom prst="flowChartDecision">
@@ -4230,7 +4206,7 @@
         </p:nvCxnSpPr>
         <p:spPr>
           <a:xfrm>
-            <a:off x="4220351" y="2760681"/>
+            <a:off x="3833828" y="1851712"/>
             <a:ext cx="266666" cy="260070"/>
           </a:xfrm>
           <a:prstGeom prst="bentConnector3">
@@ -4268,8 +4244,8 @@
         </p:nvSpPr>
         <p:spPr>
           <a:xfrm>
-            <a:off x="4477328" y="2280569"/>
-            <a:ext cx="1156969" cy="346760"/>
+            <a:off x="4090805" y="1371600"/>
+            <a:ext cx="1515940" cy="346760"/>
           </a:xfrm>
           <a:prstGeom prst="rect">
             <a:avLst/>
@@ -4301,12 +4277,12 @@
           <a:p>
             <a:pPr algn="ctr"/>
             <a:r>
-              <a:rPr lang="en-US" sz="1050" dirty="0" err="1" smtClean="0">
+              <a:rPr lang="en-US" sz="1050" dirty="0" err="1">
                 <a:solidFill>
                   <a:srgbClr val="7030A0"/>
                 </a:solidFill>
               </a:rPr>
-              <a:t>UniqueTagList</a:t>
+              <a:t>UniquePreferenceList</a:t>
             </a:r>
             <a:endParaRPr lang="en-SG" sz="1050" dirty="0">
               <a:solidFill>
@@ -4320,6 +4296,7 @@
         <p:nvCxnSpPr>
           <p:cNvPr id="59" name="Elbow Connector 58"/>
           <p:cNvCxnSpPr>
+            <a:cxnSpLocks/>
             <a:stCxn id="51" idx="3"/>
             <a:endCxn id="57" idx="1"/>
           </p:cNvCxnSpPr>
@@ -4327,7 +4304,7 @@
         </p:nvCxnSpPr>
         <p:spPr>
           <a:xfrm flipV="1">
-            <a:off x="4220351" y="2453949"/>
+            <a:off x="3833828" y="1544980"/>
             <a:ext cx="256977" cy="306732"/>
           </a:xfrm>
           <a:prstGeom prst="bentConnector3">
@@ -4367,7 +4344,7 @@
         </p:nvSpPr>
         <p:spPr>
           <a:xfrm>
-            <a:off x="6313677" y="2858066"/>
+            <a:off x="5927154" y="1949097"/>
             <a:ext cx="708186" cy="346760"/>
           </a:xfrm>
           <a:prstGeom prst="rect">
@@ -4400,7 +4377,7 @@
           <a:p>
             <a:pPr algn="ctr"/>
             <a:r>
-              <a:rPr lang="en-US" sz="1050" dirty="0" smtClean="0">
+              <a:rPr lang="en-US" sz="1050" dirty="0">
                 <a:solidFill>
                   <a:srgbClr val="7030A0"/>
                 </a:solidFill>
@@ -4423,7 +4400,7 @@
         </p:nvSpPr>
         <p:spPr>
           <a:xfrm>
-            <a:off x="5643227" y="2943979"/>
+            <a:off x="5256704" y="2035010"/>
             <a:ext cx="236048" cy="173380"/>
           </a:xfrm>
           <a:prstGeom prst="flowChartDecision">
@@ -4471,7 +4448,7 @@
         </p:nvCxnSpPr>
         <p:spPr>
           <a:xfrm>
-            <a:off x="5879275" y="3030669"/>
+            <a:off x="5492752" y="2121700"/>
             <a:ext cx="434402" cy="777"/>
           </a:xfrm>
           <a:prstGeom prst="bentConnector3">
@@ -4503,14 +4480,14 @@
       </p:cxnSp>
       <p:sp>
         <p:nvSpPr>
-          <p:cNvPr id="67" name="Rectangle 8"/>
+          <p:cNvPr id="76" name="Rectangle 8"/>
           <p:cNvSpPr/>
           <p:nvPr/>
         </p:nvSpPr>
         <p:spPr>
           <a:xfrm>
-            <a:off x="5336105" y="1809332"/>
-            <a:ext cx="483700" cy="346760"/>
+            <a:off x="7325874" y="1655269"/>
+            <a:ext cx="708186" cy="285783"/>
           </a:xfrm>
           <a:prstGeom prst="rect">
             <a:avLst/>
@@ -4542,12 +4519,12 @@
           <a:p>
             <a:pPr algn="ctr"/>
             <a:r>
-              <a:rPr lang="en-US" sz="1050" dirty="0" smtClean="0">
+              <a:rPr lang="en-US" sz="1050" dirty="0">
                 <a:solidFill>
                   <a:srgbClr val="7030A0"/>
                 </a:solidFill>
               </a:rPr>
-              <a:t>Tag</a:t>
+              <a:t>Name</a:t>
             </a:r>
             <a:endParaRPr lang="en-SG" sz="1050" dirty="0">
               <a:solidFill>
@@ -4559,19 +4536,21 @@
       </p:sp>
       <p:sp>
         <p:nvSpPr>
-          <p:cNvPr id="68" name="Flowchart: Decision 96"/>
+          <p:cNvPr id="78" name="Flowchart: Decision 96"/>
           <p:cNvSpPr/>
           <p:nvPr/>
         </p:nvSpPr>
         <p:spPr>
-          <a:xfrm rot="16200000">
-            <a:off x="4921666" y="2066540"/>
+          <a:xfrm>
+            <a:off x="6655424" y="2039232"/>
             <a:ext cx="236048" cy="173380"/>
           </a:xfrm>
           <a:prstGeom prst="flowChartDecision">
             <a:avLst/>
           </a:prstGeom>
-          <a:noFill/>
+          <a:solidFill>
+            <a:srgbClr val="7030A0"/>
+          </a:solidFill>
           <a:ln w="19050">
             <a:solidFill>
               <a:srgbClr val="7030A0"/>
@@ -4604,19 +4583,19 @@
       </p:sp>
       <p:cxnSp>
         <p:nvCxnSpPr>
-          <p:cNvPr id="69" name="Elbow Connector 68"/>
+          <p:cNvPr id="79" name="Elbow Connector 78"/>
           <p:cNvCxnSpPr>
-            <a:stCxn id="68" idx="3"/>
-            <a:endCxn id="67" idx="1"/>
+            <a:stCxn id="78" idx="3"/>
+            <a:endCxn id="76" idx="1"/>
           </p:cNvCxnSpPr>
           <p:nvPr/>
         </p:nvCxnSpPr>
         <p:spPr>
-          <a:xfrm rot="5400000" flipH="1" flipV="1">
-            <a:off x="5161650" y="1860752"/>
-            <a:ext cx="52494" cy="296415"/>
-          </a:xfrm>
-          <a:prstGeom prst="bentConnector2">
+          <a:xfrm flipV="1">
+            <a:off x="6891472" y="1798161"/>
+            <a:ext cx="434402" cy="327761"/>
+          </a:xfrm>
+          <a:prstGeom prst="bentConnector3">
             <a:avLst/>
           </a:prstGeom>
           <a:ln w="19050">
@@ -4645,13 +4624,13 @@
       </p:cxnSp>
       <p:sp>
         <p:nvSpPr>
-          <p:cNvPr id="76" name="Rectangle 8"/>
+          <p:cNvPr id="80" name="Rectangle 8"/>
           <p:cNvSpPr/>
           <p:nvPr/>
         </p:nvSpPr>
         <p:spPr>
           <a:xfrm>
-            <a:off x="7712397" y="2564238"/>
+            <a:off x="7325874" y="1978247"/>
             <a:ext cx="708186" cy="285783"/>
           </a:xfrm>
           <a:prstGeom prst="rect">
@@ -4684,12 +4663,12 @@
           <a:p>
             <a:pPr algn="ctr"/>
             <a:r>
-              <a:rPr lang="en-US" sz="1050" dirty="0" smtClean="0">
+              <a:rPr lang="en-US" sz="1050" dirty="0">
                 <a:solidFill>
                   <a:srgbClr val="7030A0"/>
                 </a:solidFill>
               </a:rPr>
-              <a:t>Name</a:t>
+              <a:t>Phone</a:t>
             </a:r>
             <a:endParaRPr lang="en-SG" sz="1050" dirty="0">
               <a:solidFill>
@@ -4699,23 +4678,1456 @@
           </a:p>
         </p:txBody>
       </p:sp>
-      <p:sp>
-        <p:nvSpPr>
-          <p:cNvPr id="78" name="Flowchart: Decision 96"/>
+      <p:cxnSp>
+        <p:nvCxnSpPr>
+          <p:cNvPr id="81" name="Elbow Connector 80"/>
+          <p:cNvCxnSpPr>
+            <a:stCxn id="78" idx="3"/>
+            <a:endCxn id="80" idx="1"/>
+          </p:cNvCxnSpPr>
+          <p:nvPr/>
+        </p:nvCxnSpPr>
+        <p:spPr>
+          <a:xfrm flipV="1">
+            <a:off x="6891472" y="2121139"/>
+            <a:ext cx="434402" cy="4783"/>
+          </a:xfrm>
+          <a:prstGeom prst="bentConnector3">
+            <a:avLst/>
+          </a:prstGeom>
+          <a:ln w="19050">
+            <a:solidFill>
+              <a:srgbClr val="7030A0"/>
+            </a:solidFill>
+            <a:headEnd type="none" w="med" len="med"/>
+            <a:tailEnd type="arrow" w="med" len="med"/>
+          </a:ln>
+          <a:effectLst/>
+        </p:spPr>
+        <p:style>
+          <a:lnRef idx="1">
+            <a:schemeClr val="accent2"/>
+          </a:lnRef>
+          <a:fillRef idx="2">
+            <a:schemeClr val="accent2"/>
+          </a:fillRef>
+          <a:effectRef idx="1">
+            <a:schemeClr val="accent2"/>
+          </a:effectRef>
+          <a:fontRef idx="minor">
+            <a:schemeClr val="dk1"/>
+          </a:fontRef>
+        </p:style>
+      </p:cxnSp>
+      <p:sp>
+        <p:nvSpPr>
+          <p:cNvPr id="83" name="Rectangle 8"/>
           <p:cNvSpPr/>
           <p:nvPr/>
         </p:nvSpPr>
         <p:spPr>
           <a:xfrm>
-            <a:off x="7041947" y="2948201"/>
+            <a:off x="7325874" y="2301225"/>
+            <a:ext cx="708186" cy="285783"/>
+          </a:xfrm>
+          <a:prstGeom prst="rect">
+            <a:avLst/>
+          </a:prstGeom>
+          <a:ln w="19050">
+            <a:solidFill>
+              <a:srgbClr val="7030A0"/>
+            </a:solidFill>
+          </a:ln>
+          <a:effectLst/>
+        </p:spPr>
+        <p:style>
+          <a:lnRef idx="1">
+            <a:schemeClr val="accent4"/>
+          </a:lnRef>
+          <a:fillRef idx="2">
+            <a:schemeClr val="accent4"/>
+          </a:fillRef>
+          <a:effectRef idx="1">
+            <a:schemeClr val="accent4"/>
+          </a:effectRef>
+          <a:fontRef idx="minor">
+            <a:schemeClr val="dk1"/>
+          </a:fontRef>
+        </p:style>
+        <p:txBody>
+          <a:bodyPr rtlCol="0" anchor="ctr"/>
+          <a:lstStyle/>
+          <a:p>
+            <a:pPr algn="ctr"/>
+            <a:r>
+              <a:rPr lang="en-US" sz="1050" dirty="0">
+                <a:solidFill>
+                  <a:srgbClr val="7030A0"/>
+                </a:solidFill>
+              </a:rPr>
+              <a:t>Email</a:t>
+            </a:r>
+            <a:endParaRPr lang="en-SG" sz="1050" dirty="0">
+              <a:solidFill>
+                <a:srgbClr val="7030A0"/>
+              </a:solidFill>
+            </a:endParaRPr>
+          </a:p>
+        </p:txBody>
+      </p:sp>
+      <p:cxnSp>
+        <p:nvCxnSpPr>
+          <p:cNvPr id="84" name="Elbow Connector 83"/>
+          <p:cNvCxnSpPr>
+            <a:stCxn id="78" idx="3"/>
+            <a:endCxn id="83" idx="1"/>
+          </p:cNvCxnSpPr>
+          <p:nvPr/>
+        </p:nvCxnSpPr>
+        <p:spPr>
+          <a:xfrm>
+            <a:off x="6891472" y="2125922"/>
+            <a:ext cx="434402" cy="318195"/>
+          </a:xfrm>
+          <a:prstGeom prst="bentConnector3">
+            <a:avLst/>
+          </a:prstGeom>
+          <a:ln w="19050">
+            <a:solidFill>
+              <a:srgbClr val="7030A0"/>
+            </a:solidFill>
+            <a:headEnd type="none" w="med" len="med"/>
+            <a:tailEnd type="arrow" w="med" len="med"/>
+          </a:ln>
+          <a:effectLst/>
+        </p:spPr>
+        <p:style>
+          <a:lnRef idx="1">
+            <a:schemeClr val="accent2"/>
+          </a:lnRef>
+          <a:fillRef idx="2">
+            <a:schemeClr val="accent2"/>
+          </a:fillRef>
+          <a:effectRef idx="1">
+            <a:schemeClr val="accent2"/>
+          </a:effectRef>
+          <a:fontRef idx="minor">
+            <a:schemeClr val="dk1"/>
+          </a:fontRef>
+        </p:style>
+      </p:cxnSp>
+      <p:sp>
+        <p:nvSpPr>
+          <p:cNvPr id="85" name="Rectangle 8"/>
+          <p:cNvSpPr/>
+          <p:nvPr/>
+        </p:nvSpPr>
+        <p:spPr>
+          <a:xfrm>
+            <a:off x="7325874" y="2624202"/>
+            <a:ext cx="708186" cy="285783"/>
+          </a:xfrm>
+          <a:prstGeom prst="rect">
+            <a:avLst/>
+          </a:prstGeom>
+          <a:ln w="19050">
+            <a:solidFill>
+              <a:srgbClr val="7030A0"/>
+            </a:solidFill>
+          </a:ln>
+          <a:effectLst/>
+        </p:spPr>
+        <p:style>
+          <a:lnRef idx="1">
+            <a:schemeClr val="accent4"/>
+          </a:lnRef>
+          <a:fillRef idx="2">
+            <a:schemeClr val="accent4"/>
+          </a:fillRef>
+          <a:effectRef idx="1">
+            <a:schemeClr val="accent4"/>
+          </a:effectRef>
+          <a:fontRef idx="minor">
+            <a:schemeClr val="dk1"/>
+          </a:fontRef>
+        </p:style>
+        <p:txBody>
+          <a:bodyPr rtlCol="0" anchor="ctr"/>
+          <a:lstStyle/>
+          <a:p>
+            <a:pPr algn="ctr"/>
+            <a:r>
+              <a:rPr lang="en-US" sz="1050" dirty="0">
+                <a:solidFill>
+                  <a:srgbClr val="7030A0"/>
+                </a:solidFill>
+              </a:rPr>
+              <a:t>Address</a:t>
+            </a:r>
+            <a:endParaRPr lang="en-SG" sz="1050" dirty="0">
+              <a:solidFill>
+                <a:srgbClr val="7030A0"/>
+              </a:solidFill>
+            </a:endParaRPr>
+          </a:p>
+        </p:txBody>
+      </p:sp>
+      <p:cxnSp>
+        <p:nvCxnSpPr>
+          <p:cNvPr id="86" name="Elbow Connector 85"/>
+          <p:cNvCxnSpPr>
+            <a:stCxn id="78" idx="3"/>
+            <a:endCxn id="85" idx="1"/>
+          </p:cNvCxnSpPr>
+          <p:nvPr/>
+        </p:nvCxnSpPr>
+        <p:spPr>
+          <a:xfrm>
+            <a:off x="6891472" y="2125922"/>
+            <a:ext cx="434402" cy="641172"/>
+          </a:xfrm>
+          <a:prstGeom prst="bentConnector3">
+            <a:avLst/>
+          </a:prstGeom>
+          <a:ln w="19050">
+            <a:solidFill>
+              <a:srgbClr val="7030A0"/>
+            </a:solidFill>
+            <a:headEnd type="none" w="med" len="med"/>
+            <a:tailEnd type="arrow" w="med" len="med"/>
+          </a:ln>
+          <a:effectLst/>
+        </p:spPr>
+        <p:style>
+          <a:lnRef idx="1">
+            <a:schemeClr val="accent2"/>
+          </a:lnRef>
+          <a:fillRef idx="2">
+            <a:schemeClr val="accent2"/>
+          </a:fillRef>
+          <a:effectRef idx="1">
+            <a:schemeClr val="accent2"/>
+          </a:effectRef>
+          <a:fontRef idx="minor">
+            <a:schemeClr val="dk1"/>
+          </a:fontRef>
+        </p:style>
+      </p:cxnSp>
+      <p:cxnSp>
+        <p:nvCxnSpPr>
+          <p:cNvPr id="97" name="Elbow Connector 63"/>
+          <p:cNvCxnSpPr>
+            <a:stCxn id="99" idx="3"/>
+          </p:cNvCxnSpPr>
+          <p:nvPr/>
+        </p:nvCxnSpPr>
+        <p:spPr>
+          <a:xfrm rot="16200000" flipH="1">
+            <a:off x="2892798" y="1576462"/>
+            <a:ext cx="293825" cy="1"/>
+          </a:xfrm>
+          <a:prstGeom prst="bentConnector3">
+            <a:avLst>
+              <a:gd name="adj1" fmla="val 50000"/>
+            </a:avLst>
+          </a:prstGeom>
+          <a:ln w="19050">
+            <a:solidFill>
+              <a:srgbClr val="7030A0"/>
+            </a:solidFill>
+            <a:prstDash val="sysDot"/>
+            <a:headEnd type="none" w="med" len="med"/>
+            <a:tailEnd type="none" w="med" len="med"/>
+          </a:ln>
+          <a:effectLst/>
+        </p:spPr>
+        <p:style>
+          <a:lnRef idx="1">
+            <a:schemeClr val="accent2"/>
+          </a:lnRef>
+          <a:fillRef idx="2">
+            <a:schemeClr val="accent2"/>
+          </a:fillRef>
+          <a:effectRef idx="1">
+            <a:schemeClr val="accent2"/>
+          </a:effectRef>
+          <a:fontRef idx="minor">
+            <a:schemeClr val="dk1"/>
+          </a:fontRef>
+        </p:style>
+      </p:cxnSp>
+      <p:sp>
+        <p:nvSpPr>
+          <p:cNvPr id="99" name="Isosceles Triangle 102"/>
+          <p:cNvSpPr/>
+          <p:nvPr/>
+        </p:nvSpPr>
+        <p:spPr>
+          <a:xfrm rot="10800000" flipV="1">
+            <a:off x="2904458" y="1254028"/>
+            <a:ext cx="270504" cy="175523"/>
+          </a:xfrm>
+          <a:prstGeom prst="triangle">
+            <a:avLst/>
+          </a:prstGeom>
+          <a:ln w="19050">
+            <a:solidFill>
+              <a:srgbClr val="7030A0"/>
+            </a:solidFill>
+          </a:ln>
+          <a:effectLst/>
+        </p:spPr>
+        <p:style>
+          <a:lnRef idx="1">
+            <a:schemeClr val="accent4"/>
+          </a:lnRef>
+          <a:fillRef idx="2">
+            <a:schemeClr val="accent4"/>
+          </a:fillRef>
+          <a:effectRef idx="1">
+            <a:schemeClr val="accent4"/>
+          </a:effectRef>
+          <a:fontRef idx="minor">
+            <a:schemeClr val="dk1"/>
+          </a:fontRef>
+        </p:style>
+        <p:txBody>
+          <a:bodyPr rtlCol="0" anchor="ctr"/>
+          <a:lstStyle/>
+          <a:p>
+            <a:pPr algn="ctr"/>
+            <a:endParaRPr lang="en-SG" sz="1050" b="1">
+              <a:solidFill>
+                <a:srgbClr val="92D050"/>
+              </a:solidFill>
+            </a:endParaRPr>
+          </a:p>
+        </p:txBody>
+      </p:sp>
+      <p:sp>
+        <p:nvSpPr>
+          <p:cNvPr id="100" name="Rectangle 8"/>
+          <p:cNvSpPr/>
+          <p:nvPr/>
+        </p:nvSpPr>
+        <p:spPr>
+          <a:xfrm>
+            <a:off x="2273780" y="897501"/>
+            <a:ext cx="1539926" cy="346760"/>
+          </a:xfrm>
+          <a:prstGeom prst="rect">
+            <a:avLst/>
+          </a:prstGeom>
+          <a:ln w="19050">
+            <a:solidFill>
+              <a:srgbClr val="7030A0"/>
+            </a:solidFill>
+          </a:ln>
+          <a:effectLst/>
+        </p:spPr>
+        <p:style>
+          <a:lnRef idx="1">
+            <a:schemeClr val="accent4"/>
+          </a:lnRef>
+          <a:fillRef idx="2">
+            <a:schemeClr val="accent4"/>
+          </a:fillRef>
+          <a:effectRef idx="1">
+            <a:schemeClr val="accent4"/>
+          </a:effectRef>
+          <a:fontRef idx="minor">
+            <a:schemeClr val="dk1"/>
+          </a:fontRef>
+        </p:style>
+        <p:txBody>
+          <a:bodyPr rtlCol="0" anchor="ctr"/>
+          <a:lstStyle/>
+          <a:p>
+            <a:pPr algn="ctr"/>
+            <a:r>
+              <a:rPr lang="en-US" sz="1050" dirty="0">
+                <a:solidFill>
+                  <a:srgbClr val="7030A0"/>
+                </a:solidFill>
+              </a:rPr>
+              <a:t>&lt;&lt;interface&gt;&gt;</a:t>
+            </a:r>
+            <a:br>
+              <a:rPr lang="en-US" sz="1050" dirty="0">
+                <a:solidFill>
+                  <a:srgbClr val="7030A0"/>
+                </a:solidFill>
+              </a:rPr>
+            </a:br>
+            <a:r>
+              <a:rPr lang="en-US" sz="1050" dirty="0" err="1">
+                <a:solidFill>
+                  <a:srgbClr val="7030A0"/>
+                </a:solidFill>
+              </a:rPr>
+              <a:t>ReadOnlyAddressBook</a:t>
+            </a:r>
+            <a:endParaRPr lang="en-SG" sz="1050" dirty="0">
+              <a:solidFill>
+                <a:srgbClr val="7030A0"/>
+              </a:solidFill>
+            </a:endParaRPr>
+          </a:p>
+        </p:txBody>
+      </p:sp>
+      <p:sp>
+        <p:nvSpPr>
+          <p:cNvPr id="114" name="TextBox 113"/>
+          <p:cNvSpPr txBox="1"/>
+          <p:nvPr/>
+        </p:nvSpPr>
+        <p:spPr>
+          <a:xfrm rot="16200000">
+            <a:off x="6160258" y="1296416"/>
+            <a:ext cx="881018" cy="261610"/>
+          </a:xfrm>
+          <a:prstGeom prst="rect">
+            <a:avLst/>
+          </a:prstGeom>
+          <a:noFill/>
+        </p:spPr>
+        <p:txBody>
+          <a:bodyPr wrap="square" rtlCol="0">
+            <a:spAutoFit/>
+          </a:bodyPr>
+          <a:lstStyle/>
+          <a:p>
+            <a:pPr algn="r"/>
+            <a:r>
+              <a:rPr lang="en-US" sz="1100" dirty="0">
+                <a:solidFill>
+                  <a:srgbClr val="7030A0"/>
+                </a:solidFill>
+              </a:rPr>
+              <a:t>filtered list</a:t>
+            </a:r>
+            <a:endParaRPr lang="en-SG" sz="1100" dirty="0">
+              <a:solidFill>
+                <a:srgbClr val="7030A0"/>
+              </a:solidFill>
+            </a:endParaRPr>
+          </a:p>
+        </p:txBody>
+      </p:sp>
+      <p:sp>
+        <p:nvSpPr>
+          <p:cNvPr id="122" name="Rectangle 8"/>
+          <p:cNvSpPr/>
+          <p:nvPr/>
+        </p:nvSpPr>
+        <p:spPr>
+          <a:xfrm>
+            <a:off x="930001" y="4185570"/>
+            <a:ext cx="1066800" cy="346760"/>
+          </a:xfrm>
+          <a:prstGeom prst="rect">
+            <a:avLst/>
+          </a:prstGeom>
+          <a:ln w="19050">
+            <a:solidFill>
+              <a:srgbClr val="7030A0"/>
+            </a:solidFill>
+          </a:ln>
+          <a:effectLst/>
+        </p:spPr>
+        <p:style>
+          <a:lnRef idx="1">
+            <a:schemeClr val="accent4"/>
+          </a:lnRef>
+          <a:fillRef idx="2">
+            <a:schemeClr val="accent4"/>
+          </a:fillRef>
+          <a:effectRef idx="1">
+            <a:schemeClr val="accent4"/>
+          </a:effectRef>
+          <a:fontRef idx="minor">
+            <a:schemeClr val="dk1"/>
+          </a:fontRef>
+        </p:style>
+        <p:txBody>
+          <a:bodyPr rtlCol="0" anchor="ctr"/>
+          <a:lstStyle/>
+          <a:p>
+            <a:pPr algn="ctr"/>
+            <a:r>
+              <a:rPr lang="en-US" sz="1050" dirty="0">
+                <a:solidFill>
+                  <a:srgbClr val="7030A0"/>
+                </a:solidFill>
+              </a:rPr>
+              <a:t>&lt;&lt;interface&gt;&gt;</a:t>
+            </a:r>
+            <a:br>
+              <a:rPr lang="en-US" sz="1050" dirty="0">
+                <a:solidFill>
+                  <a:srgbClr val="7030A0"/>
+                </a:solidFill>
+              </a:rPr>
+            </a:br>
+            <a:r>
+              <a:rPr lang="en-US" sz="1050" dirty="0" err="1">
+                <a:solidFill>
+                  <a:srgbClr val="7030A0"/>
+                </a:solidFill>
+              </a:rPr>
+              <a:t>ObservableList</a:t>
+            </a:r>
+            <a:endParaRPr lang="en-SG" sz="1050" dirty="0">
+              <a:solidFill>
+                <a:srgbClr val="7030A0"/>
+              </a:solidFill>
+            </a:endParaRPr>
+          </a:p>
+        </p:txBody>
+      </p:sp>
+      <p:cxnSp>
+        <p:nvCxnSpPr>
+          <p:cNvPr id="124" name="Elbow Connector 122"/>
+          <p:cNvCxnSpPr>
+            <a:cxnSpLocks/>
+            <a:stCxn id="119" idx="1"/>
+            <a:endCxn id="122" idx="0"/>
+          </p:cNvCxnSpPr>
+          <p:nvPr/>
+        </p:nvCxnSpPr>
+        <p:spPr>
+          <a:xfrm rot="16200000" flipH="1">
+            <a:off x="533380" y="3255548"/>
+            <a:ext cx="1513139" cy="346904"/>
+          </a:xfrm>
+          <a:prstGeom prst="bentConnector3">
+            <a:avLst>
+              <a:gd name="adj1" fmla="val 50000"/>
+            </a:avLst>
+          </a:prstGeom>
+          <a:ln w="19050">
+            <a:solidFill>
+              <a:srgbClr val="7030A0"/>
+            </a:solidFill>
+            <a:prstDash val="sysDot"/>
+            <a:headEnd type="none" w="med" len="med"/>
+            <a:tailEnd type="arrow" w="med" len="med"/>
+          </a:ln>
+          <a:effectLst/>
+        </p:spPr>
+        <p:style>
+          <a:lnRef idx="1">
+            <a:schemeClr val="accent2"/>
+          </a:lnRef>
+          <a:fillRef idx="2">
+            <a:schemeClr val="accent2"/>
+          </a:fillRef>
+          <a:effectRef idx="1">
+            <a:schemeClr val="accent2"/>
+          </a:effectRef>
+          <a:fontRef idx="minor">
+            <a:schemeClr val="dk1"/>
+          </a:fontRef>
+        </p:style>
+      </p:cxnSp>
+      <p:cxnSp>
+        <p:nvCxnSpPr>
+          <p:cNvPr id="50" name="Elbow Connector 49"/>
+          <p:cNvCxnSpPr>
+            <a:cxnSpLocks/>
+            <a:stCxn id="62" idx="0"/>
+          </p:cNvCxnSpPr>
+          <p:nvPr/>
+        </p:nvCxnSpPr>
+        <p:spPr>
+          <a:xfrm rot="16200000" flipV="1">
+            <a:off x="5741939" y="1409788"/>
+            <a:ext cx="404117" cy="674501"/>
+          </a:xfrm>
+          <a:prstGeom prst="bentConnector2">
+            <a:avLst/>
+          </a:prstGeom>
+          <a:ln w="19050">
+            <a:solidFill>
+              <a:srgbClr val="7030A0"/>
+            </a:solidFill>
+            <a:headEnd type="none" w="med" len="med"/>
+            <a:tailEnd type="arrow" w="med" len="med"/>
+          </a:ln>
+          <a:effectLst/>
+        </p:spPr>
+        <p:style>
+          <a:lnRef idx="1">
+            <a:schemeClr val="accent2"/>
+          </a:lnRef>
+          <a:fillRef idx="2">
+            <a:schemeClr val="accent2"/>
+          </a:fillRef>
+          <a:effectRef idx="1">
+            <a:schemeClr val="accent2"/>
+          </a:effectRef>
+          <a:fontRef idx="minor">
+            <a:schemeClr val="dk1"/>
+          </a:fontRef>
+        </p:style>
+      </p:cxnSp>
+      <p:sp>
+        <p:nvSpPr>
+          <p:cNvPr id="11" name="TextBox 10"/>
+          <p:cNvSpPr txBox="1"/>
+          <p:nvPr/>
+        </p:nvSpPr>
+        <p:spPr>
+          <a:xfrm>
+            <a:off x="3938449" y="1282259"/>
+            <a:ext cx="189257" cy="178683"/>
+          </a:xfrm>
+          <a:prstGeom prst="rect">
+            <a:avLst/>
+          </a:prstGeom>
+          <a:noFill/>
+        </p:spPr>
+        <p:txBody>
+          <a:bodyPr wrap="square" lIns="0" tIns="0" rIns="0" bIns="0" rtlCol="0">
+            <a:noAutofit/>
+          </a:bodyPr>
+          <a:lstStyle/>
+          <a:p>
+            <a:pPr algn="ctr"/>
+            <a:r>
+              <a:rPr lang="en-US" sz="1100" dirty="0">
+                <a:solidFill>
+                  <a:srgbClr val="7030A0"/>
+                </a:solidFill>
+              </a:rPr>
+              <a:t>1</a:t>
+            </a:r>
+            <a:endParaRPr lang="en-SG" sz="1100" dirty="0">
+              <a:solidFill>
+                <a:srgbClr val="7030A0"/>
+              </a:solidFill>
+            </a:endParaRPr>
+          </a:p>
+        </p:txBody>
+      </p:sp>
+      <p:sp>
+        <p:nvSpPr>
+          <p:cNvPr id="54" name="TextBox 53"/>
+          <p:cNvSpPr txBox="1"/>
+          <p:nvPr/>
+        </p:nvSpPr>
+        <p:spPr>
+          <a:xfrm>
+            <a:off x="3938449" y="2149895"/>
+            <a:ext cx="189257" cy="178683"/>
+          </a:xfrm>
+          <a:prstGeom prst="rect">
+            <a:avLst/>
+          </a:prstGeom>
+          <a:noFill/>
+        </p:spPr>
+        <p:txBody>
+          <a:bodyPr wrap="square" lIns="0" tIns="0" rIns="0" bIns="0" rtlCol="0">
+            <a:noAutofit/>
+          </a:bodyPr>
+          <a:lstStyle/>
+          <a:p>
+            <a:pPr algn="ctr"/>
+            <a:r>
+              <a:rPr lang="en-US" sz="1100" dirty="0">
+                <a:solidFill>
+                  <a:srgbClr val="7030A0"/>
+                </a:solidFill>
+              </a:rPr>
+              <a:t>1</a:t>
+            </a:r>
+            <a:endParaRPr lang="en-SG" sz="1100" dirty="0">
+              <a:solidFill>
+                <a:srgbClr val="7030A0"/>
+              </a:solidFill>
+            </a:endParaRPr>
+          </a:p>
+        </p:txBody>
+      </p:sp>
+      <p:sp>
+        <p:nvSpPr>
+          <p:cNvPr id="56" name="TextBox 55"/>
+          <p:cNvSpPr txBox="1"/>
+          <p:nvPr/>
+        </p:nvSpPr>
+        <p:spPr>
+          <a:xfrm>
+            <a:off x="5606746" y="1644434"/>
+            <a:ext cx="189257" cy="178683"/>
+          </a:xfrm>
+          <a:prstGeom prst="rect">
+            <a:avLst/>
+          </a:prstGeom>
+          <a:noFill/>
+        </p:spPr>
+        <p:txBody>
+          <a:bodyPr wrap="square" lIns="0" tIns="0" rIns="0" bIns="0" rtlCol="0">
+            <a:noAutofit/>
+          </a:bodyPr>
+          <a:lstStyle/>
+          <a:p>
+            <a:pPr algn="ctr"/>
+            <a:r>
+              <a:rPr lang="en-US" sz="1100" dirty="0">
+                <a:solidFill>
+                  <a:srgbClr val="7030A0"/>
+                </a:solidFill>
+              </a:rPr>
+              <a:t>1</a:t>
+            </a:r>
+            <a:endParaRPr lang="en-SG" sz="1100" dirty="0">
+              <a:solidFill>
+                <a:srgbClr val="7030A0"/>
+              </a:solidFill>
+            </a:endParaRPr>
+          </a:p>
+        </p:txBody>
+      </p:sp>
+      <p:sp>
+        <p:nvSpPr>
+          <p:cNvPr id="61" name="TextBox 60"/>
+          <p:cNvSpPr txBox="1"/>
+          <p:nvPr/>
+        </p:nvSpPr>
+        <p:spPr>
+          <a:xfrm>
+            <a:off x="5748733" y="2188948"/>
+            <a:ext cx="189257" cy="178683"/>
+          </a:xfrm>
+          <a:prstGeom prst="rect">
+            <a:avLst/>
+          </a:prstGeom>
+          <a:noFill/>
+        </p:spPr>
+        <p:txBody>
+          <a:bodyPr wrap="square" lIns="0" tIns="0" rIns="0" bIns="0" rtlCol="0">
+            <a:noAutofit/>
+          </a:bodyPr>
+          <a:lstStyle/>
+          <a:p>
+            <a:pPr algn="ctr"/>
+            <a:r>
+              <a:rPr lang="en-US" sz="1100" dirty="0">
+                <a:solidFill>
+                  <a:srgbClr val="7030A0"/>
+                </a:solidFill>
+              </a:rPr>
+              <a:t>*</a:t>
+            </a:r>
+            <a:endParaRPr lang="en-SG" sz="1100" dirty="0">
+              <a:solidFill>
+                <a:srgbClr val="7030A0"/>
+              </a:solidFill>
+            </a:endParaRPr>
+          </a:p>
+        </p:txBody>
+      </p:sp>
+      <p:sp>
+        <p:nvSpPr>
+          <p:cNvPr id="65" name="TextBox 64"/>
+          <p:cNvSpPr txBox="1"/>
+          <p:nvPr/>
+        </p:nvSpPr>
+        <p:spPr>
+          <a:xfrm>
+            <a:off x="2301400" y="1655269"/>
+            <a:ext cx="189257" cy="178683"/>
+          </a:xfrm>
+          <a:prstGeom prst="rect">
+            <a:avLst/>
+          </a:prstGeom>
+          <a:noFill/>
+        </p:spPr>
+        <p:txBody>
+          <a:bodyPr wrap="square" lIns="0" tIns="0" rIns="0" bIns="0" rtlCol="0">
+            <a:noAutofit/>
+          </a:bodyPr>
+          <a:lstStyle/>
+          <a:p>
+            <a:pPr algn="ctr"/>
+            <a:r>
+              <a:rPr lang="en-US" sz="1100" dirty="0">
+                <a:solidFill>
+                  <a:srgbClr val="7030A0"/>
+                </a:solidFill>
+              </a:rPr>
+              <a:t>1</a:t>
+            </a:r>
+            <a:endParaRPr lang="en-SG" sz="1100" dirty="0">
+              <a:solidFill>
+                <a:srgbClr val="7030A0"/>
+              </a:solidFill>
+            </a:endParaRPr>
+          </a:p>
+        </p:txBody>
+      </p:sp>
+      <p:sp>
+        <p:nvSpPr>
+          <p:cNvPr id="66" name="TextBox 65"/>
+          <p:cNvSpPr txBox="1"/>
+          <p:nvPr/>
+        </p:nvSpPr>
+        <p:spPr>
+          <a:xfrm>
+            <a:off x="2269847" y="2477081"/>
+            <a:ext cx="189257" cy="178683"/>
+          </a:xfrm>
+          <a:prstGeom prst="rect">
+            <a:avLst/>
+          </a:prstGeom>
+          <a:noFill/>
+        </p:spPr>
+        <p:txBody>
+          <a:bodyPr wrap="square" lIns="0" tIns="0" rIns="0" bIns="0" rtlCol="0">
+            <a:noAutofit/>
+          </a:bodyPr>
+          <a:lstStyle/>
+          <a:p>
+            <a:pPr algn="ctr"/>
+            <a:r>
+              <a:rPr lang="en-US" sz="1100" dirty="0">
+                <a:solidFill>
+                  <a:srgbClr val="7030A0"/>
+                </a:solidFill>
+              </a:rPr>
+              <a:t>1</a:t>
+            </a:r>
+            <a:endParaRPr lang="en-SG" sz="1100" dirty="0">
+              <a:solidFill>
+                <a:srgbClr val="7030A0"/>
+              </a:solidFill>
+            </a:endParaRPr>
+          </a:p>
+        </p:txBody>
+      </p:sp>
+      <p:sp>
+        <p:nvSpPr>
+          <p:cNvPr id="70" name="TextBox 69"/>
+          <p:cNvSpPr txBox="1"/>
+          <p:nvPr/>
+        </p:nvSpPr>
+        <p:spPr>
+          <a:xfrm>
+            <a:off x="6537380" y="1766198"/>
+            <a:ext cx="189257" cy="178683"/>
+          </a:xfrm>
+          <a:prstGeom prst="rect">
+            <a:avLst/>
+          </a:prstGeom>
+          <a:noFill/>
+        </p:spPr>
+        <p:txBody>
+          <a:bodyPr wrap="square" lIns="0" tIns="0" rIns="0" bIns="0" rtlCol="0">
+            <a:noAutofit/>
+          </a:bodyPr>
+          <a:lstStyle/>
+          <a:p>
+            <a:pPr algn="ctr"/>
+            <a:r>
+              <a:rPr lang="en-US" sz="1100" dirty="0">
+                <a:solidFill>
+                  <a:srgbClr val="7030A0"/>
+                </a:solidFill>
+              </a:rPr>
+              <a:t>1</a:t>
+            </a:r>
+            <a:endParaRPr lang="en-SG" sz="1100" dirty="0">
+              <a:solidFill>
+                <a:srgbClr val="7030A0"/>
+              </a:solidFill>
+            </a:endParaRPr>
+          </a:p>
+        </p:txBody>
+      </p:sp>
+      <p:sp>
+        <p:nvSpPr>
+          <p:cNvPr id="52" name="Rectangle 8">
+            <a:extLst>
+              <a:ext uri="{FF2B5EF4-FFF2-40B4-BE49-F238E27FC236}">
+                <a16:creationId xmlns:a16="http://schemas.microsoft.com/office/drawing/2014/main" id="{3B836D16-3567-4A1C-81C7-433A2D8FEEA2}"/>
+              </a:ext>
+            </a:extLst>
+          </p:cNvPr>
+          <p:cNvSpPr/>
+          <p:nvPr/>
+        </p:nvSpPr>
+        <p:spPr>
+          <a:xfrm>
+            <a:off x="4090805" y="2482384"/>
+            <a:ext cx="1156969" cy="346760"/>
+          </a:xfrm>
+          <a:prstGeom prst="rect">
+            <a:avLst/>
+          </a:prstGeom>
+          <a:ln w="19050">
+            <a:solidFill>
+              <a:srgbClr val="7030A0"/>
+            </a:solidFill>
+          </a:ln>
+          <a:effectLst/>
+        </p:spPr>
+        <p:style>
+          <a:lnRef idx="1">
+            <a:schemeClr val="accent4"/>
+          </a:lnRef>
+          <a:fillRef idx="2">
+            <a:schemeClr val="accent4"/>
+          </a:fillRef>
+          <a:effectRef idx="1">
+            <a:schemeClr val="accent4"/>
+          </a:effectRef>
+          <a:fontRef idx="minor">
+            <a:schemeClr val="dk1"/>
+          </a:fontRef>
+        </p:style>
+        <p:txBody>
+          <a:bodyPr rtlCol="0" anchor="ctr"/>
+          <a:lstStyle/>
+          <a:p>
+            <a:pPr algn="ctr"/>
+            <a:r>
+              <a:rPr lang="en-US" sz="1050" dirty="0" err="1">
+                <a:solidFill>
+                  <a:srgbClr val="7030A0"/>
+                </a:solidFill>
+              </a:rPr>
+              <a:t>UniqueOrderList</a:t>
+            </a:r>
+            <a:endParaRPr lang="en-SG" sz="1050" dirty="0">
+              <a:solidFill>
+                <a:srgbClr val="7030A0"/>
+              </a:solidFill>
+            </a:endParaRPr>
+          </a:p>
+        </p:txBody>
+      </p:sp>
+      <p:cxnSp>
+        <p:nvCxnSpPr>
+          <p:cNvPr id="53" name="Elbow Connector 29">
+            <a:extLst>
+              <a:ext uri="{FF2B5EF4-FFF2-40B4-BE49-F238E27FC236}">
+                <a16:creationId xmlns:a16="http://schemas.microsoft.com/office/drawing/2014/main" id="{68B35781-23C6-442B-8302-BF0113103B75}"/>
+              </a:ext>
+            </a:extLst>
+          </p:cNvPr>
+          <p:cNvCxnSpPr>
+            <a:cxnSpLocks/>
+            <a:stCxn id="51" idx="3"/>
+            <a:endCxn id="52" idx="1"/>
+          </p:cNvCxnSpPr>
+          <p:nvPr/>
+        </p:nvCxnSpPr>
+        <p:spPr>
+          <a:xfrm>
+            <a:off x="3833828" y="1851712"/>
+            <a:ext cx="256977" cy="804052"/>
+          </a:xfrm>
+          <a:prstGeom prst="bentConnector3">
+            <a:avLst>
+              <a:gd name="adj1" fmla="val 50000"/>
+            </a:avLst>
+          </a:prstGeom>
+          <a:ln w="19050">
+            <a:solidFill>
+              <a:srgbClr val="7030A0"/>
+            </a:solidFill>
+            <a:headEnd type="none" w="med" len="med"/>
+            <a:tailEnd type="arrow" w="med" len="med"/>
+          </a:ln>
+          <a:effectLst/>
+        </p:spPr>
+        <p:style>
+          <a:lnRef idx="1">
+            <a:schemeClr val="accent2"/>
+          </a:lnRef>
+          <a:fillRef idx="2">
+            <a:schemeClr val="accent2"/>
+          </a:fillRef>
+          <a:effectRef idx="1">
+            <a:schemeClr val="accent2"/>
+          </a:effectRef>
+          <a:fontRef idx="minor">
+            <a:schemeClr val="dk1"/>
+          </a:fontRef>
+        </p:style>
+      </p:cxnSp>
+      <p:sp>
+        <p:nvSpPr>
+          <p:cNvPr id="71" name="TextBox 70">
+            <a:extLst>
+              <a:ext uri="{FF2B5EF4-FFF2-40B4-BE49-F238E27FC236}">
+                <a16:creationId xmlns:a16="http://schemas.microsoft.com/office/drawing/2014/main" id="{CA52B217-5F80-4CAE-A892-D20DE5B9A802}"/>
+              </a:ext>
+            </a:extLst>
+          </p:cNvPr>
+          <p:cNvSpPr txBox="1"/>
+          <p:nvPr/>
+        </p:nvSpPr>
+        <p:spPr>
+          <a:xfrm>
+            <a:off x="3911237" y="2720228"/>
+            <a:ext cx="189257" cy="178683"/>
+          </a:xfrm>
+          <a:prstGeom prst="rect">
+            <a:avLst/>
+          </a:prstGeom>
+          <a:noFill/>
+        </p:spPr>
+        <p:txBody>
+          <a:bodyPr wrap="square" lIns="0" tIns="0" rIns="0" bIns="0" rtlCol="0">
+            <a:noAutofit/>
+          </a:bodyPr>
+          <a:lstStyle/>
+          <a:p>
+            <a:pPr algn="ctr"/>
+            <a:r>
+              <a:rPr lang="en-US" sz="1100" dirty="0">
+                <a:solidFill>
+                  <a:srgbClr val="7030A0"/>
+                </a:solidFill>
+              </a:rPr>
+              <a:t>1</a:t>
+            </a:r>
+            <a:endParaRPr lang="en-SG" sz="1100" dirty="0">
+              <a:solidFill>
+                <a:srgbClr val="7030A0"/>
+              </a:solidFill>
+            </a:endParaRPr>
+          </a:p>
+        </p:txBody>
+      </p:sp>
+      <p:cxnSp>
+        <p:nvCxnSpPr>
+          <p:cNvPr id="73" name="Elbow Connector 49">
+            <a:extLst>
+              <a:ext uri="{FF2B5EF4-FFF2-40B4-BE49-F238E27FC236}">
+                <a16:creationId xmlns:a16="http://schemas.microsoft.com/office/drawing/2014/main" id="{B1457FAC-4CE6-4FB6-A3B5-936272DDFDC5}"/>
+              </a:ext>
+            </a:extLst>
+          </p:cNvPr>
+          <p:cNvCxnSpPr>
+            <a:cxnSpLocks/>
+          </p:cNvCxnSpPr>
+          <p:nvPr/>
+        </p:nvCxnSpPr>
+        <p:spPr>
+          <a:xfrm>
+            <a:off x="6489638" y="774878"/>
+            <a:ext cx="8246" cy="1163524"/>
+          </a:xfrm>
+          <a:prstGeom prst="straightConnector1">
+            <a:avLst/>
+          </a:prstGeom>
+          <a:ln w="19050">
+            <a:solidFill>
+              <a:srgbClr val="7030A0"/>
+            </a:solidFill>
+            <a:headEnd type="none" w="med" len="med"/>
+            <a:tailEnd type="arrow" w="med" len="med"/>
+          </a:ln>
+          <a:effectLst/>
+        </p:spPr>
+        <p:style>
+          <a:lnRef idx="1">
+            <a:schemeClr val="accent2"/>
+          </a:lnRef>
+          <a:fillRef idx="2">
+            <a:schemeClr val="accent2"/>
+          </a:fillRef>
+          <a:effectRef idx="1">
+            <a:schemeClr val="accent2"/>
+          </a:effectRef>
+          <a:fontRef idx="minor">
+            <a:schemeClr val="dk1"/>
+          </a:fontRef>
+        </p:style>
+      </p:cxnSp>
+      <p:sp>
+        <p:nvSpPr>
+          <p:cNvPr id="74" name="Rectangle 8">
+            <a:extLst>
+              <a:ext uri="{FF2B5EF4-FFF2-40B4-BE49-F238E27FC236}">
+                <a16:creationId xmlns:a16="http://schemas.microsoft.com/office/drawing/2014/main" id="{CF574BE2-3AEF-4770-B793-AAA418CF0FAE}"/>
+              </a:ext>
+            </a:extLst>
+          </p:cNvPr>
+          <p:cNvSpPr/>
+          <p:nvPr/>
+        </p:nvSpPr>
+        <p:spPr>
+          <a:xfrm>
+            <a:off x="4090805" y="915205"/>
+            <a:ext cx="1156969" cy="346760"/>
+          </a:xfrm>
+          <a:prstGeom prst="rect">
+            <a:avLst/>
+          </a:prstGeom>
+          <a:ln w="19050">
+            <a:solidFill>
+              <a:srgbClr val="7030A0"/>
+            </a:solidFill>
+          </a:ln>
+          <a:effectLst/>
+        </p:spPr>
+        <p:style>
+          <a:lnRef idx="1">
+            <a:schemeClr val="accent4"/>
+          </a:lnRef>
+          <a:fillRef idx="2">
+            <a:schemeClr val="accent4"/>
+          </a:fillRef>
+          <a:effectRef idx="1">
+            <a:schemeClr val="accent4"/>
+          </a:effectRef>
+          <a:fontRef idx="minor">
+            <a:schemeClr val="dk1"/>
+          </a:fontRef>
+        </p:style>
+        <p:txBody>
+          <a:bodyPr rtlCol="0" anchor="ctr"/>
+          <a:lstStyle/>
+          <a:p>
+            <a:pPr algn="ctr"/>
+            <a:r>
+              <a:rPr lang="en-US" sz="1050" dirty="0" err="1">
+                <a:solidFill>
+                  <a:srgbClr val="7030A0"/>
+                </a:solidFill>
+              </a:rPr>
+              <a:t>UniqueGroupList</a:t>
+            </a:r>
+            <a:endParaRPr lang="en-SG" sz="1050" dirty="0">
+              <a:solidFill>
+                <a:srgbClr val="7030A0"/>
+              </a:solidFill>
+            </a:endParaRPr>
+          </a:p>
+        </p:txBody>
+      </p:sp>
+      <p:cxnSp>
+        <p:nvCxnSpPr>
+          <p:cNvPr id="77" name="Elbow Connector 58">
+            <a:extLst>
+              <a:ext uri="{FF2B5EF4-FFF2-40B4-BE49-F238E27FC236}">
+                <a16:creationId xmlns:a16="http://schemas.microsoft.com/office/drawing/2014/main" id="{5F12695C-BEA0-4D13-94BB-763A48C268BA}"/>
+              </a:ext>
+            </a:extLst>
+          </p:cNvPr>
+          <p:cNvCxnSpPr>
+            <a:cxnSpLocks/>
+            <a:stCxn id="51" idx="3"/>
+            <a:endCxn id="74" idx="1"/>
+          </p:cNvCxnSpPr>
+          <p:nvPr/>
+        </p:nvCxnSpPr>
+        <p:spPr>
+          <a:xfrm flipV="1">
+            <a:off x="3833828" y="1088585"/>
+            <a:ext cx="256977" cy="763127"/>
+          </a:xfrm>
+          <a:prstGeom prst="bentConnector3">
+            <a:avLst>
+              <a:gd name="adj1" fmla="val 50000"/>
+            </a:avLst>
+          </a:prstGeom>
+          <a:ln w="19050">
+            <a:solidFill>
+              <a:srgbClr val="7030A0"/>
+            </a:solidFill>
+            <a:headEnd type="none" w="med" len="med"/>
+            <a:tailEnd type="arrow" w="med" len="med"/>
+          </a:ln>
+          <a:effectLst/>
+        </p:spPr>
+        <p:style>
+          <a:lnRef idx="1">
+            <a:schemeClr val="accent2"/>
+          </a:lnRef>
+          <a:fillRef idx="2">
+            <a:schemeClr val="accent2"/>
+          </a:fillRef>
+          <a:effectRef idx="1">
+            <a:schemeClr val="accent2"/>
+          </a:effectRef>
+          <a:fontRef idx="minor">
+            <a:schemeClr val="dk1"/>
+          </a:fontRef>
+        </p:style>
+      </p:cxnSp>
+      <p:cxnSp>
+        <p:nvCxnSpPr>
+          <p:cNvPr id="82" name="Elbow Connector 49">
+            <a:extLst>
+              <a:ext uri="{FF2B5EF4-FFF2-40B4-BE49-F238E27FC236}">
+                <a16:creationId xmlns:a16="http://schemas.microsoft.com/office/drawing/2014/main" id="{1772D531-E5AA-4295-BC3E-7A9D863D8C06}"/>
+              </a:ext>
+            </a:extLst>
+          </p:cNvPr>
+          <p:cNvCxnSpPr>
+            <a:cxnSpLocks/>
+            <a:stCxn id="62" idx="0"/>
+            <a:endCxn id="74" idx="3"/>
+          </p:cNvCxnSpPr>
+          <p:nvPr/>
+        </p:nvCxnSpPr>
+        <p:spPr>
+          <a:xfrm rot="16200000" flipV="1">
+            <a:off x="5334255" y="1002104"/>
+            <a:ext cx="860512" cy="1033473"/>
+          </a:xfrm>
+          <a:prstGeom prst="bentConnector2">
+            <a:avLst/>
+          </a:prstGeom>
+          <a:ln w="19050">
+            <a:solidFill>
+              <a:srgbClr val="7030A0"/>
+            </a:solidFill>
+            <a:headEnd type="none" w="med" len="med"/>
+            <a:tailEnd type="arrow" w="med" len="med"/>
+          </a:ln>
+          <a:effectLst/>
+        </p:spPr>
+        <p:style>
+          <a:lnRef idx="1">
+            <a:schemeClr val="accent2"/>
+          </a:lnRef>
+          <a:fillRef idx="2">
+            <a:schemeClr val="accent2"/>
+          </a:fillRef>
+          <a:effectRef idx="1">
+            <a:schemeClr val="accent2"/>
+          </a:effectRef>
+          <a:fontRef idx="minor">
+            <a:schemeClr val="dk1"/>
+          </a:fontRef>
+        </p:style>
+      </p:cxnSp>
+      <p:sp>
+        <p:nvSpPr>
+          <p:cNvPr id="87" name="TextBox 86">
+            <a:extLst>
+              <a:ext uri="{FF2B5EF4-FFF2-40B4-BE49-F238E27FC236}">
+                <a16:creationId xmlns:a16="http://schemas.microsoft.com/office/drawing/2014/main" id="{378728B6-E449-4144-A980-C745672FAA38}"/>
+              </a:ext>
+            </a:extLst>
+          </p:cNvPr>
+          <p:cNvSpPr txBox="1"/>
+          <p:nvPr/>
+        </p:nvSpPr>
+        <p:spPr>
+          <a:xfrm>
+            <a:off x="3938449" y="825864"/>
+            <a:ext cx="189257" cy="178683"/>
+          </a:xfrm>
+          <a:prstGeom prst="rect">
+            <a:avLst/>
+          </a:prstGeom>
+          <a:noFill/>
+        </p:spPr>
+        <p:txBody>
+          <a:bodyPr wrap="square" lIns="0" tIns="0" rIns="0" bIns="0" rtlCol="0">
+            <a:noAutofit/>
+          </a:bodyPr>
+          <a:lstStyle/>
+          <a:p>
+            <a:pPr algn="ctr"/>
+            <a:r>
+              <a:rPr lang="en-US" sz="1100" dirty="0">
+                <a:solidFill>
+                  <a:srgbClr val="7030A0"/>
+                </a:solidFill>
+              </a:rPr>
+              <a:t>1</a:t>
+            </a:r>
+            <a:endParaRPr lang="en-SG" sz="1100" dirty="0">
+              <a:solidFill>
+                <a:srgbClr val="7030A0"/>
+              </a:solidFill>
+            </a:endParaRPr>
+          </a:p>
+        </p:txBody>
+      </p:sp>
+      <p:sp>
+        <p:nvSpPr>
+          <p:cNvPr id="88" name="TextBox 87">
+            <a:extLst>
+              <a:ext uri="{FF2B5EF4-FFF2-40B4-BE49-F238E27FC236}">
+                <a16:creationId xmlns:a16="http://schemas.microsoft.com/office/drawing/2014/main" id="{28D0C0C8-F439-44FD-82CE-22BC3D488330}"/>
+              </a:ext>
+            </a:extLst>
+          </p:cNvPr>
+          <p:cNvSpPr txBox="1"/>
+          <p:nvPr/>
+        </p:nvSpPr>
+        <p:spPr>
+          <a:xfrm>
+            <a:off x="5303238" y="1130049"/>
+            <a:ext cx="189257" cy="178683"/>
+          </a:xfrm>
+          <a:prstGeom prst="rect">
+            <a:avLst/>
+          </a:prstGeom>
+          <a:noFill/>
+        </p:spPr>
+        <p:txBody>
+          <a:bodyPr wrap="square" lIns="0" tIns="0" rIns="0" bIns="0" rtlCol="0">
+            <a:noAutofit/>
+          </a:bodyPr>
+          <a:lstStyle/>
+          <a:p>
+            <a:pPr algn="ctr"/>
+            <a:r>
+              <a:rPr lang="en-US" sz="1100" dirty="0">
+                <a:solidFill>
+                  <a:srgbClr val="7030A0"/>
+                </a:solidFill>
+              </a:rPr>
+              <a:t>1</a:t>
+            </a:r>
+            <a:endParaRPr lang="en-SG" sz="1100" dirty="0">
+              <a:solidFill>
+                <a:srgbClr val="7030A0"/>
+              </a:solidFill>
+            </a:endParaRPr>
+          </a:p>
+        </p:txBody>
+      </p:sp>
+      <p:sp>
+        <p:nvSpPr>
+          <p:cNvPr id="89" name="Rectangle 8">
+            <a:extLst>
+              <a:ext uri="{FF2B5EF4-FFF2-40B4-BE49-F238E27FC236}">
+                <a16:creationId xmlns:a16="http://schemas.microsoft.com/office/drawing/2014/main" id="{EEF58835-83D9-4A23-8D71-588A26186022}"/>
+              </a:ext>
+            </a:extLst>
+          </p:cNvPr>
+          <p:cNvSpPr/>
+          <p:nvPr/>
+        </p:nvSpPr>
+        <p:spPr>
+          <a:xfrm>
+            <a:off x="2492967" y="3082240"/>
+            <a:ext cx="1200462" cy="346760"/>
+          </a:xfrm>
+          <a:prstGeom prst="rect">
+            <a:avLst/>
+          </a:prstGeom>
+          <a:ln w="19050">
+            <a:solidFill>
+              <a:srgbClr val="7030A0"/>
+            </a:solidFill>
+          </a:ln>
+          <a:effectLst/>
+        </p:spPr>
+        <p:style>
+          <a:lnRef idx="1">
+            <a:schemeClr val="accent4"/>
+          </a:lnRef>
+          <a:fillRef idx="2">
+            <a:schemeClr val="accent4"/>
+          </a:fillRef>
+          <a:effectRef idx="1">
+            <a:schemeClr val="accent4"/>
+          </a:effectRef>
+          <a:fontRef idx="minor">
+            <a:schemeClr val="dk1"/>
+          </a:fontRef>
+        </p:style>
+        <p:txBody>
+          <a:bodyPr rtlCol="0" anchor="ctr"/>
+          <a:lstStyle/>
+          <a:p>
+            <a:pPr algn="ctr"/>
+            <a:r>
+              <a:rPr lang="en-US" sz="1050" dirty="0" err="1">
+                <a:solidFill>
+                  <a:srgbClr val="7030A0"/>
+                </a:solidFill>
+              </a:rPr>
+              <a:t>CalendarManager</a:t>
+            </a:r>
+            <a:endParaRPr lang="en-SG" sz="1050" dirty="0">
+              <a:solidFill>
+                <a:srgbClr val="7030A0"/>
+              </a:solidFill>
+            </a:endParaRPr>
+          </a:p>
+        </p:txBody>
+      </p:sp>
+      <p:cxnSp>
+        <p:nvCxnSpPr>
+          <p:cNvPr id="90" name="Straight Arrow Connector 89">
+            <a:extLst>
+              <a:ext uri="{FF2B5EF4-FFF2-40B4-BE49-F238E27FC236}">
+                <a16:creationId xmlns:a16="http://schemas.microsoft.com/office/drawing/2014/main" id="{DE3F4D11-56EE-4F9C-8947-75ABE3345291}"/>
+              </a:ext>
+            </a:extLst>
+          </p:cNvPr>
+          <p:cNvCxnSpPr>
+            <a:cxnSpLocks/>
+            <a:stCxn id="91" idx="3"/>
+            <a:endCxn id="89" idx="1"/>
+          </p:cNvCxnSpPr>
+          <p:nvPr/>
+        </p:nvCxnSpPr>
+        <p:spPr>
+          <a:xfrm rot="16200000" flipH="1">
+            <a:off x="2010711" y="2773363"/>
+            <a:ext cx="328027" cy="636485"/>
+          </a:xfrm>
+          <a:prstGeom prst="bentConnector2">
+            <a:avLst/>
+          </a:prstGeom>
+          <a:ln w="19050">
+            <a:solidFill>
+              <a:srgbClr val="7030A0"/>
+            </a:solidFill>
+            <a:headEnd type="none" w="med" len="med"/>
+            <a:tailEnd type="arrow" w="med" len="med"/>
+          </a:ln>
+          <a:effectLst/>
+        </p:spPr>
+        <p:style>
+          <a:lnRef idx="1">
+            <a:schemeClr val="accent2"/>
+          </a:lnRef>
+          <a:fillRef idx="2">
+            <a:schemeClr val="accent2"/>
+          </a:fillRef>
+          <a:effectRef idx="1">
+            <a:schemeClr val="accent2"/>
+          </a:effectRef>
+          <a:fontRef idx="minor">
+            <a:schemeClr val="dk1"/>
+          </a:fontRef>
+        </p:style>
+      </p:cxnSp>
+      <p:sp>
+        <p:nvSpPr>
+          <p:cNvPr id="91" name="Flowchart: Decision 96">
+            <a:extLst>
+              <a:ext uri="{FF2B5EF4-FFF2-40B4-BE49-F238E27FC236}">
+                <a16:creationId xmlns:a16="http://schemas.microsoft.com/office/drawing/2014/main" id="{7294B89C-D84C-4591-9E7E-8EA6DFF70D5A}"/>
+              </a:ext>
+            </a:extLst>
+          </p:cNvPr>
+          <p:cNvSpPr/>
+          <p:nvPr/>
+        </p:nvSpPr>
+        <p:spPr>
+          <a:xfrm rot="5400000">
+            <a:off x="1738458" y="2722879"/>
             <a:ext cx="236048" cy="173380"/>
           </a:xfrm>
           <a:prstGeom prst="flowChartDecision">
             <a:avLst/>
           </a:prstGeom>
-          <a:solidFill>
-            <a:srgbClr val="7030A0"/>
-          </a:solidFill>
+          <a:noFill/>
           <a:ln w="19050">
             <a:solidFill>
               <a:srgbClr val="7030A0"/>
@@ -4746,59 +6158,24 @@
           </a:p>
         </p:txBody>
       </p:sp>
-      <p:cxnSp>
-        <p:nvCxnSpPr>
-          <p:cNvPr id="79" name="Elbow Connector 78"/>
-          <p:cNvCxnSpPr>
-            <a:stCxn id="78" idx="3"/>
-            <a:endCxn id="76" idx="1"/>
-          </p:cNvCxnSpPr>
-          <p:nvPr/>
-        </p:nvCxnSpPr>
-        <p:spPr>
-          <a:xfrm flipV="1">
-            <a:off x="7277995" y="2707130"/>
-            <a:ext cx="434402" cy="327761"/>
-          </a:xfrm>
-          <a:prstGeom prst="bentConnector3">
-            <a:avLst/>
-          </a:prstGeom>
-          <a:ln w="19050">
-            <a:solidFill>
-              <a:srgbClr val="7030A0"/>
-            </a:solidFill>
-            <a:headEnd type="none" w="med" len="med"/>
-            <a:tailEnd type="arrow" w="med" len="med"/>
-          </a:ln>
-          <a:effectLst/>
-        </p:spPr>
-        <p:style>
-          <a:lnRef idx="1">
-            <a:schemeClr val="accent2"/>
-          </a:lnRef>
-          <a:fillRef idx="2">
-            <a:schemeClr val="accent2"/>
-          </a:fillRef>
-          <a:effectRef idx="1">
-            <a:schemeClr val="accent2"/>
-          </a:effectRef>
-          <a:fontRef idx="minor">
-            <a:schemeClr val="dk1"/>
-          </a:fontRef>
-        </p:style>
-      </p:cxnSp>
-      <p:sp>
-        <p:nvSpPr>
-          <p:cNvPr id="80" name="Rectangle 8"/>
+      <p:sp>
+        <p:nvSpPr>
+          <p:cNvPr id="92" name="Isosceles Triangle 102">
+            <a:extLst>
+              <a:ext uri="{FF2B5EF4-FFF2-40B4-BE49-F238E27FC236}">
+                <a16:creationId xmlns:a16="http://schemas.microsoft.com/office/drawing/2014/main" id="{45315016-E6EB-4D19-BF47-CC99D67D4D92}"/>
+              </a:ext>
+            </a:extLst>
+          </p:cNvPr>
           <p:cNvSpPr/>
           <p:nvPr/>
         </p:nvSpPr>
         <p:spPr>
-          <a:xfrm>
-            <a:off x="7712397" y="2887216"/>
-            <a:ext cx="708186" cy="285783"/>
-          </a:xfrm>
-          <a:prstGeom prst="rect">
+          <a:xfrm flipV="1">
+            <a:off x="2954735" y="3728199"/>
+            <a:ext cx="270504" cy="175523"/>
+          </a:xfrm>
+          <a:prstGeom prst="triangle">
             <a:avLst/>
           </a:prstGeom>
           <a:ln w="19050">
@@ -4827,73 +6204,30 @@
           <a:lstStyle/>
           <a:p>
             <a:pPr algn="ctr"/>
-            <a:r>
-              <a:rPr lang="en-US" sz="1050" dirty="0" smtClean="0">
-                <a:solidFill>
-                  <a:srgbClr val="7030A0"/>
-                </a:solidFill>
-              </a:rPr>
-              <a:t>Phone</a:t>
-            </a:r>
-            <a:endParaRPr lang="en-SG" sz="1050" dirty="0">
+            <a:endParaRPr lang="en-SG" sz="1050" b="1">
               <a:solidFill>
-                <a:srgbClr val="7030A0"/>
+                <a:srgbClr val="92D050"/>
               </a:solidFill>
             </a:endParaRPr>
           </a:p>
         </p:txBody>
       </p:sp>
-      <p:cxnSp>
-        <p:nvCxnSpPr>
-          <p:cNvPr id="81" name="Elbow Connector 80"/>
-          <p:cNvCxnSpPr>
-            <a:stCxn id="78" idx="3"/>
-            <a:endCxn id="80" idx="1"/>
-          </p:cNvCxnSpPr>
-          <p:nvPr/>
-        </p:nvCxnSpPr>
-        <p:spPr>
-          <a:xfrm flipV="1">
-            <a:off x="7277995" y="3030108"/>
-            <a:ext cx="434402" cy="4783"/>
-          </a:xfrm>
-          <a:prstGeom prst="bentConnector3">
-            <a:avLst/>
-          </a:prstGeom>
-          <a:ln w="19050">
-            <a:solidFill>
-              <a:srgbClr val="7030A0"/>
-            </a:solidFill>
-            <a:headEnd type="none" w="med" len="med"/>
-            <a:tailEnd type="arrow" w="med" len="med"/>
-          </a:ln>
-          <a:effectLst/>
-        </p:spPr>
-        <p:style>
-          <a:lnRef idx="1">
-            <a:schemeClr val="accent2"/>
-          </a:lnRef>
-          <a:fillRef idx="2">
-            <a:schemeClr val="accent2"/>
-          </a:fillRef>
-          <a:effectRef idx="1">
-            <a:schemeClr val="accent2"/>
-          </a:effectRef>
-          <a:fontRef idx="minor">
-            <a:schemeClr val="dk1"/>
-          </a:fontRef>
-        </p:style>
-      </p:cxnSp>
-      <p:sp>
-        <p:nvSpPr>
-          <p:cNvPr id="83" name="Rectangle 8"/>
+      <p:sp>
+        <p:nvSpPr>
+          <p:cNvPr id="93" name="Rectangle 8">
+            <a:extLst>
+              <a:ext uri="{FF2B5EF4-FFF2-40B4-BE49-F238E27FC236}">
+                <a16:creationId xmlns:a16="http://schemas.microsoft.com/office/drawing/2014/main" id="{B96F20E8-8F85-4E74-B7C7-0C474C41D7C6}"/>
+              </a:ext>
+            </a:extLst>
+          </p:cNvPr>
           <p:cNvSpPr/>
           <p:nvPr/>
         </p:nvSpPr>
         <p:spPr>
           <a:xfrm>
-            <a:off x="7712397" y="3210194"/>
-            <a:ext cx="708186" cy="285783"/>
+            <a:off x="2151823" y="3915009"/>
+            <a:ext cx="1835003" cy="346760"/>
           </a:xfrm>
           <a:prstGeom prst="rect">
             <a:avLst/>
@@ -4925,12 +6259,27 @@
           <a:p>
             <a:pPr algn="ctr"/>
             <a:r>
-              <a:rPr lang="en-US" sz="1050" dirty="0" smtClean="0">
+              <a:rPr lang="en-US" sz="1050" dirty="0">
                 <a:solidFill>
                   <a:srgbClr val="7030A0"/>
                 </a:solidFill>
               </a:rPr>
-              <a:t>Email</a:t>
+              <a:t>&lt;&lt;interface&gt;&gt;</a:t>
+            </a:r>
+            <a:br>
+              <a:rPr lang="en-US" sz="1050" dirty="0">
+                <a:solidFill>
+                  <a:srgbClr val="7030A0"/>
+                </a:solidFill>
+              </a:rPr>
+            </a:br>
+            <a:r>
+              <a:rPr lang="en-US" sz="1050" dirty="0" err="1">
+                <a:solidFill>
+                  <a:srgbClr val="7030A0"/>
+                </a:solidFill>
+              </a:rPr>
+              <a:t>ReadOnlyCalendarManager</a:t>
             </a:r>
             <a:endParaRPr lang="en-SG" sz="1050" dirty="0">
               <a:solidFill>
@@ -4940,29 +6289,82 @@
           </a:p>
         </p:txBody>
       </p:sp>
+      <p:sp>
+        <p:nvSpPr>
+          <p:cNvPr id="94" name="TextBox 93">
+            <a:extLst>
+              <a:ext uri="{FF2B5EF4-FFF2-40B4-BE49-F238E27FC236}">
+                <a16:creationId xmlns:a16="http://schemas.microsoft.com/office/drawing/2014/main" id="{3CA8F3BE-7E92-4E3E-9B04-D9CDA0DC9432}"/>
+              </a:ext>
+            </a:extLst>
+          </p:cNvPr>
+          <p:cNvSpPr txBox="1"/>
+          <p:nvPr/>
+        </p:nvSpPr>
+        <p:spPr>
+          <a:xfrm>
+            <a:off x="2269846" y="3029993"/>
+            <a:ext cx="189257" cy="178683"/>
+          </a:xfrm>
+          <a:prstGeom prst="rect">
+            <a:avLst/>
+          </a:prstGeom>
+          <a:noFill/>
+        </p:spPr>
+        <p:txBody>
+          <a:bodyPr wrap="square" lIns="0" tIns="0" rIns="0" bIns="0" rtlCol="0">
+            <a:noAutofit/>
+          </a:bodyPr>
+          <a:lstStyle/>
+          <a:p>
+            <a:pPr algn="ctr"/>
+            <a:r>
+              <a:rPr lang="en-US" sz="1100" dirty="0">
+                <a:solidFill>
+                  <a:srgbClr val="7030A0"/>
+                </a:solidFill>
+              </a:rPr>
+              <a:t>1</a:t>
+            </a:r>
+            <a:endParaRPr lang="en-SG" sz="1100" dirty="0">
+              <a:solidFill>
+                <a:srgbClr val="7030A0"/>
+              </a:solidFill>
+            </a:endParaRPr>
+          </a:p>
+        </p:txBody>
+      </p:sp>
       <p:cxnSp>
         <p:nvCxnSpPr>
-          <p:cNvPr id="84" name="Elbow Connector 83"/>
+          <p:cNvPr id="95" name="Elbow Connector 63">
+            <a:extLst>
+              <a:ext uri="{FF2B5EF4-FFF2-40B4-BE49-F238E27FC236}">
+                <a16:creationId xmlns:a16="http://schemas.microsoft.com/office/drawing/2014/main" id="{94F0CEB5-B2CA-4227-8446-C82AD2B6369C}"/>
+              </a:ext>
+            </a:extLst>
+          </p:cNvPr>
           <p:cNvCxnSpPr>
-            <a:stCxn id="78" idx="3"/>
-            <a:endCxn id="83" idx="1"/>
+            <a:cxnSpLocks/>
           </p:cNvCxnSpPr>
           <p:nvPr/>
         </p:nvCxnSpPr>
         <p:spPr>
-          <a:xfrm>
-            <a:off x="7277995" y="3034891"/>
-            <a:ext cx="434402" cy="318195"/>
+          <a:xfrm rot="16200000" flipH="1">
+            <a:off x="2942767" y="3581286"/>
+            <a:ext cx="293825" cy="1"/>
           </a:xfrm>
           <a:prstGeom prst="bentConnector3">
-            <a:avLst/>
+            <a:avLst>
+              <a:gd name="adj1" fmla="val 50000"/>
+            </a:avLst>
           </a:prstGeom>
           <a:ln w="19050">
             <a:solidFill>
               <a:srgbClr val="7030A0"/>
             </a:solidFill>
+            <a:prstDash val="sysDot"/>
             <a:headEnd type="none" w="med" len="med"/>
-            <a:tailEnd type="arrow" w="med" len="med"/>
+            <a:tailEnd type="none" w="med" len="med"/>
           </a:ln>
           <a:effectLst/>
         </p:spPr>
@@ -4983,14 +6385,20 @@
       </p:cxnSp>
       <p:sp>
         <p:nvSpPr>
-          <p:cNvPr id="85" name="Rectangle 8"/>
+          <p:cNvPr id="96" name="Rectangle 8">
+            <a:extLst>
+              <a:ext uri="{FF2B5EF4-FFF2-40B4-BE49-F238E27FC236}">
+                <a16:creationId xmlns:a16="http://schemas.microsoft.com/office/drawing/2014/main" id="{B8A3C503-C993-400B-AC0D-9E5CC1A6B933}"/>
+              </a:ext>
+            </a:extLst>
+          </p:cNvPr>
           <p:cNvSpPr/>
           <p:nvPr/>
         </p:nvSpPr>
         <p:spPr>
           <a:xfrm>
-            <a:off x="7712397" y="3533171"/>
-            <a:ext cx="708186" cy="285783"/>
+            <a:off x="5927154" y="2482384"/>
+            <a:ext cx="708186" cy="346760"/>
           </a:xfrm>
           <a:prstGeom prst="rect">
             <a:avLst/>
@@ -5022,12 +6430,12 @@
           <a:p>
             <a:pPr algn="ctr"/>
             <a:r>
-              <a:rPr lang="en-US" sz="1050" dirty="0" smtClean="0">
+              <a:rPr lang="en-US" sz="1050" dirty="0">
                 <a:solidFill>
                   <a:srgbClr val="7030A0"/>
                 </a:solidFill>
               </a:rPr>
-              <a:t>Address</a:t>
+              <a:t>Order</a:t>
             </a:r>
             <a:endParaRPr lang="en-SG" sz="1050" dirty="0">
               <a:solidFill>
@@ -5037,19 +6445,76 @@
           </a:p>
         </p:txBody>
       </p:sp>
+      <p:sp>
+        <p:nvSpPr>
+          <p:cNvPr id="98" name="Flowchart: Decision 96">
+            <a:extLst>
+              <a:ext uri="{FF2B5EF4-FFF2-40B4-BE49-F238E27FC236}">
+                <a16:creationId xmlns:a16="http://schemas.microsoft.com/office/drawing/2014/main" id="{70130DCD-07D8-4C86-A863-9F28F06B809E}"/>
+              </a:ext>
+            </a:extLst>
+          </p:cNvPr>
+          <p:cNvSpPr/>
+          <p:nvPr/>
+        </p:nvSpPr>
+        <p:spPr>
+          <a:xfrm>
+            <a:off x="5256704" y="2568297"/>
+            <a:ext cx="236048" cy="173380"/>
+          </a:xfrm>
+          <a:prstGeom prst="flowChartDecision">
+            <a:avLst/>
+          </a:prstGeom>
+          <a:noFill/>
+          <a:ln w="19050">
+            <a:solidFill>
+              <a:srgbClr val="7030A0"/>
+            </a:solidFill>
+          </a:ln>
+          <a:effectLst/>
+        </p:spPr>
+        <p:style>
+          <a:lnRef idx="1">
+            <a:schemeClr val="accent6"/>
+          </a:lnRef>
+          <a:fillRef idx="2">
+            <a:schemeClr val="accent6"/>
+          </a:fillRef>
+          <a:effectRef idx="1">
+            <a:schemeClr val="accent6"/>
+          </a:effectRef>
+          <a:fontRef idx="minor">
+            <a:schemeClr val="dk1"/>
+          </a:fontRef>
+        </p:style>
+        <p:txBody>
+          <a:bodyPr rtlCol="0" anchor="ctr"/>
+          <a:lstStyle/>
+          <a:p>
+            <a:pPr algn="ctr"/>
+            <a:endParaRPr lang="en-US" sz="1050"/>
+          </a:p>
+        </p:txBody>
+      </p:sp>
       <p:cxnSp>
         <p:nvCxnSpPr>
-          <p:cNvPr id="86" name="Elbow Connector 85"/>
+          <p:cNvPr id="101" name="Elbow Connector 63">
+            <a:extLst>
+              <a:ext uri="{FF2B5EF4-FFF2-40B4-BE49-F238E27FC236}">
+                <a16:creationId xmlns:a16="http://schemas.microsoft.com/office/drawing/2014/main" id="{063DA670-7742-4FD3-AB68-EB4994A4BE1F}"/>
+              </a:ext>
+            </a:extLst>
+          </p:cNvPr>
           <p:cNvCxnSpPr>
-            <a:stCxn id="78" idx="3"/>
-            <a:endCxn id="85" idx="1"/>
+            <a:stCxn id="98" idx="3"/>
+            <a:endCxn id="96" idx="1"/>
           </p:cNvCxnSpPr>
           <p:nvPr/>
         </p:nvCxnSpPr>
         <p:spPr>
           <a:xfrm>
-            <a:off x="7277995" y="3034891"/>
-            <a:ext cx="434402" cy="641172"/>
+            <a:off x="5492752" y="2654987"/>
+            <a:ext cx="434402" cy="777"/>
           </a:xfrm>
           <a:prstGeom prst="bentConnector3">
             <a:avLst/>
@@ -5078,18 +6543,122 @@
           </a:fontRef>
         </p:style>
       </p:cxnSp>
+      <p:sp>
+        <p:nvSpPr>
+          <p:cNvPr id="102" name="TextBox 101">
+            <a:extLst>
+              <a:ext uri="{FF2B5EF4-FFF2-40B4-BE49-F238E27FC236}">
+                <a16:creationId xmlns:a16="http://schemas.microsoft.com/office/drawing/2014/main" id="{020DCFD9-6E15-4F9E-9371-D0EB5B91C4D9}"/>
+              </a:ext>
+            </a:extLst>
+          </p:cNvPr>
+          <p:cNvSpPr txBox="1"/>
+          <p:nvPr/>
+        </p:nvSpPr>
+        <p:spPr>
+          <a:xfrm>
+            <a:off x="5748733" y="2722235"/>
+            <a:ext cx="189257" cy="178683"/>
+          </a:xfrm>
+          <a:prstGeom prst="rect">
+            <a:avLst/>
+          </a:prstGeom>
+          <a:noFill/>
+        </p:spPr>
+        <p:txBody>
+          <a:bodyPr wrap="square" lIns="0" tIns="0" rIns="0" bIns="0" rtlCol="0">
+            <a:noAutofit/>
+          </a:bodyPr>
+          <a:lstStyle/>
+          <a:p>
+            <a:pPr algn="ctr"/>
+            <a:r>
+              <a:rPr lang="en-US" sz="1100" dirty="0">
+                <a:solidFill>
+                  <a:srgbClr val="7030A0"/>
+                </a:solidFill>
+              </a:rPr>
+              <a:t>*</a:t>
+            </a:r>
+            <a:endParaRPr lang="en-SG" sz="1100" dirty="0">
+              <a:solidFill>
+                <a:srgbClr val="7030A0"/>
+              </a:solidFill>
+            </a:endParaRPr>
+          </a:p>
+        </p:txBody>
+      </p:sp>
+      <p:sp>
+        <p:nvSpPr>
+          <p:cNvPr id="103" name="Flowchart: Decision 96">
+            <a:extLst>
+              <a:ext uri="{FF2B5EF4-FFF2-40B4-BE49-F238E27FC236}">
+                <a16:creationId xmlns:a16="http://schemas.microsoft.com/office/drawing/2014/main" id="{A0811A25-9890-4A7C-8BA3-D8EBE05F0B15}"/>
+              </a:ext>
+            </a:extLst>
+          </p:cNvPr>
+          <p:cNvSpPr/>
+          <p:nvPr/>
+        </p:nvSpPr>
+        <p:spPr>
+          <a:xfrm>
+            <a:off x="3702401" y="3167301"/>
+            <a:ext cx="236048" cy="173380"/>
+          </a:xfrm>
+          <a:prstGeom prst="flowChartDecision">
+            <a:avLst/>
+          </a:prstGeom>
+          <a:solidFill>
+            <a:srgbClr val="7030A0"/>
+          </a:solidFill>
+          <a:ln w="19050">
+            <a:solidFill>
+              <a:srgbClr val="7030A0"/>
+            </a:solidFill>
+          </a:ln>
+          <a:effectLst/>
+        </p:spPr>
+        <p:style>
+          <a:lnRef idx="1">
+            <a:schemeClr val="accent6"/>
+          </a:lnRef>
+          <a:fillRef idx="2">
+            <a:schemeClr val="accent6"/>
+          </a:fillRef>
+          <a:effectRef idx="1">
+            <a:schemeClr val="accent6"/>
+          </a:effectRef>
+          <a:fontRef idx="minor">
+            <a:schemeClr val="dk1"/>
+          </a:fontRef>
+        </p:style>
+        <p:txBody>
+          <a:bodyPr rtlCol="0" anchor="ctr"/>
+          <a:lstStyle/>
+          <a:p>
+            <a:pPr algn="ctr"/>
+            <a:endParaRPr lang="en-US" sz="1050"/>
+          </a:p>
+        </p:txBody>
+      </p:sp>
       <p:cxnSp>
         <p:nvCxnSpPr>
-          <p:cNvPr id="97" name="Elbow Connector 63"/>
+          <p:cNvPr id="104" name="Elbow Connector 58">
+            <a:extLst>
+              <a:ext uri="{FF2B5EF4-FFF2-40B4-BE49-F238E27FC236}">
+                <a16:creationId xmlns:a16="http://schemas.microsoft.com/office/drawing/2014/main" id="{8B55FCFB-ECF5-4FAF-9C2F-AE33627C47DC}"/>
+              </a:ext>
+            </a:extLst>
+          </p:cNvPr>
           <p:cNvCxnSpPr>
-            <a:stCxn id="99" idx="3"/>
+            <a:cxnSpLocks/>
           </p:cNvCxnSpPr>
           <p:nvPr/>
         </p:nvCxnSpPr>
         <p:spPr>
-          <a:xfrm rot="16200000" flipH="1">
-            <a:off x="3279321" y="2485431"/>
-            <a:ext cx="293825" cy="1"/>
+          <a:xfrm flipV="1">
+            <a:off x="3938449" y="3254063"/>
+            <a:ext cx="753175" cy="1"/>
           </a:xfrm>
           <a:prstGeom prst="bentConnector3">
             <a:avLst>
@@ -5100,9 +6669,8 @@
             <a:solidFill>
               <a:srgbClr val="7030A0"/>
             </a:solidFill>
-            <a:prstDash val="sysDot"/>
             <a:headEnd type="none" w="med" len="med"/>
-            <a:tailEnd type="none" w="med" len="med"/>
+            <a:tailEnd type="arrow" w="med" len="med"/>
           </a:ln>
           <a:effectLst/>
         </p:spPr>
@@ -5123,16 +6691,22 @@
       </p:cxnSp>
       <p:sp>
         <p:nvSpPr>
-          <p:cNvPr id="99" name="Isosceles Triangle 102"/>
+          <p:cNvPr id="105" name="Rectangle 8">
+            <a:extLst>
+              <a:ext uri="{FF2B5EF4-FFF2-40B4-BE49-F238E27FC236}">
+                <a16:creationId xmlns:a16="http://schemas.microsoft.com/office/drawing/2014/main" id="{C19958E1-060B-4F02-B662-B530B02918E5}"/>
+              </a:ext>
+            </a:extLst>
+          </p:cNvPr>
           <p:cNvSpPr/>
           <p:nvPr/>
         </p:nvSpPr>
         <p:spPr>
-          <a:xfrm rot="10800000" flipV="1">
-            <a:off x="3290981" y="2162997"/>
-            <a:ext cx="270504" cy="175523"/>
-          </a:xfrm>
-          <a:prstGeom prst="triangle">
+          <a:xfrm>
+            <a:off x="4691623" y="3080610"/>
+            <a:ext cx="1589615" cy="353753"/>
+          </a:xfrm>
+          <a:prstGeom prst="rect">
             <a:avLst/>
           </a:prstGeom>
           <a:ln w="19050">
@@ -5161,9 +6735,17 @@
           <a:lstStyle/>
           <a:p>
             <a:pPr algn="ctr"/>
-            <a:endParaRPr lang="en-SG" sz="1050" b="1">
+            <a:r>
+              <a:rPr lang="en-US" sz="1050" dirty="0" err="1">
+                <a:solidFill>
+                  <a:srgbClr val="7030A0"/>
+                </a:solidFill>
+              </a:rPr>
+              <a:t>UniqueCalendarEntryList</a:t>
+            </a:r>
+            <a:endParaRPr lang="en-SG" sz="1050" dirty="0">
               <a:solidFill>
-                <a:srgbClr val="92D050"/>
+                <a:srgbClr val="7030A0"/>
               </a:solidFill>
             </a:endParaRPr>
           </a:p>
@@ -5171,14 +6753,65 @@
       </p:sp>
       <p:sp>
         <p:nvSpPr>
-          <p:cNvPr id="100" name="Rectangle 8"/>
+          <p:cNvPr id="106" name="TextBox 105">
+            <a:extLst>
+              <a:ext uri="{FF2B5EF4-FFF2-40B4-BE49-F238E27FC236}">
+                <a16:creationId xmlns:a16="http://schemas.microsoft.com/office/drawing/2014/main" id="{18096DA2-4798-4F94-9F62-272BE3482B07}"/>
+              </a:ext>
+            </a:extLst>
+          </p:cNvPr>
+          <p:cNvSpPr txBox="1"/>
+          <p:nvPr/>
+        </p:nvSpPr>
+        <p:spPr>
+          <a:xfrm>
+            <a:off x="4433088" y="3067227"/>
+            <a:ext cx="189257" cy="178683"/>
+          </a:xfrm>
+          <a:prstGeom prst="rect">
+            <a:avLst/>
+          </a:prstGeom>
+          <a:noFill/>
+        </p:spPr>
+        <p:txBody>
+          <a:bodyPr wrap="square" lIns="0" tIns="0" rIns="0" bIns="0" rtlCol="0">
+            <a:noAutofit/>
+          </a:bodyPr>
+          <a:lstStyle/>
+          <a:p>
+            <a:pPr algn="ctr"/>
+            <a:r>
+              <a:rPr lang="en-US" sz="1100" dirty="0">
+                <a:solidFill>
+                  <a:srgbClr val="7030A0"/>
+                </a:solidFill>
+              </a:rPr>
+              <a:t>1</a:t>
+            </a:r>
+            <a:endParaRPr lang="en-SG" sz="1100" dirty="0">
+              <a:solidFill>
+                <a:srgbClr val="7030A0"/>
+              </a:solidFill>
+            </a:endParaRPr>
+          </a:p>
+        </p:txBody>
+      </p:sp>
+      <p:sp>
+        <p:nvSpPr>
+          <p:cNvPr id="108" name="Rectangle 8">
+            <a:extLst>
+              <a:ext uri="{FF2B5EF4-FFF2-40B4-BE49-F238E27FC236}">
+                <a16:creationId xmlns:a16="http://schemas.microsoft.com/office/drawing/2014/main" id="{0FD50D4D-EEF1-49BF-820A-E9B628D00B8A}"/>
+              </a:ext>
+            </a:extLst>
+          </p:cNvPr>
           <p:cNvSpPr/>
           <p:nvPr/>
         </p:nvSpPr>
         <p:spPr>
           <a:xfrm>
-            <a:off x="2660303" y="1806470"/>
-            <a:ext cx="1539926" cy="346760"/>
+            <a:off x="6955950" y="3082240"/>
+            <a:ext cx="1078109" cy="346760"/>
           </a:xfrm>
           <a:prstGeom prst="rect">
             <a:avLst/>
@@ -5210,27 +6843,12 @@
           <a:p>
             <a:pPr algn="ctr"/>
             <a:r>
-              <a:rPr lang="en-US" sz="1050" dirty="0" smtClean="0">
+              <a:rPr lang="en-US" sz="1050" dirty="0" err="1">
                 <a:solidFill>
                   <a:srgbClr val="7030A0"/>
                 </a:solidFill>
               </a:rPr>
-              <a:t>&lt;&lt;interface&gt;&gt;</a:t>
-            </a:r>
-            <a:br>
-              <a:rPr lang="en-US" sz="1050" dirty="0" smtClean="0">
-                <a:solidFill>
-                  <a:srgbClr val="7030A0"/>
-                </a:solidFill>
-              </a:rPr>
-            </a:br>
-            <a:r>
-              <a:rPr lang="en-US" sz="1050" dirty="0" err="1" smtClean="0">
-                <a:solidFill>
-                  <a:srgbClr val="7030A0"/>
-                </a:solidFill>
-              </a:rPr>
-              <a:t>ReadOnlyAddressBook</a:t>
+              <a:t>CalendarEntry</a:t>
             </a:r>
             <a:endParaRPr lang="en-SG" sz="1050" dirty="0">
               <a:solidFill>
@@ -5242,14 +6860,119 @@
       </p:sp>
       <p:sp>
         <p:nvSpPr>
-          <p:cNvPr id="114" name="TextBox 113"/>
+          <p:cNvPr id="109" name="Flowchart: Decision 96">
+            <a:extLst>
+              <a:ext uri="{FF2B5EF4-FFF2-40B4-BE49-F238E27FC236}">
+                <a16:creationId xmlns:a16="http://schemas.microsoft.com/office/drawing/2014/main" id="{B9B2ECBA-7E73-4893-95F0-843B9C976576}"/>
+              </a:ext>
+            </a:extLst>
+          </p:cNvPr>
+          <p:cNvSpPr/>
+          <p:nvPr/>
+        </p:nvSpPr>
+        <p:spPr>
+          <a:xfrm>
+            <a:off x="6285501" y="3168153"/>
+            <a:ext cx="236048" cy="173380"/>
+          </a:xfrm>
+          <a:prstGeom prst="flowChartDecision">
+            <a:avLst/>
+          </a:prstGeom>
+          <a:noFill/>
+          <a:ln w="19050">
+            <a:solidFill>
+              <a:srgbClr val="7030A0"/>
+            </a:solidFill>
+          </a:ln>
+          <a:effectLst/>
+        </p:spPr>
+        <p:style>
+          <a:lnRef idx="1">
+            <a:schemeClr val="accent6"/>
+          </a:lnRef>
+          <a:fillRef idx="2">
+            <a:schemeClr val="accent6"/>
+          </a:fillRef>
+          <a:effectRef idx="1">
+            <a:schemeClr val="accent6"/>
+          </a:effectRef>
+          <a:fontRef idx="minor">
+            <a:schemeClr val="dk1"/>
+          </a:fontRef>
+        </p:style>
+        <p:txBody>
+          <a:bodyPr rtlCol="0" anchor="ctr"/>
+          <a:lstStyle/>
+          <a:p>
+            <a:pPr algn="ctr"/>
+            <a:endParaRPr lang="en-US" sz="1050"/>
+          </a:p>
+        </p:txBody>
+      </p:sp>
+      <p:cxnSp>
+        <p:nvCxnSpPr>
+          <p:cNvPr id="110" name="Elbow Connector 63">
+            <a:extLst>
+              <a:ext uri="{FF2B5EF4-FFF2-40B4-BE49-F238E27FC236}">
+                <a16:creationId xmlns:a16="http://schemas.microsoft.com/office/drawing/2014/main" id="{36C695A8-2D1B-473E-A4DE-A605A7AA04B6}"/>
+              </a:ext>
+            </a:extLst>
+          </p:cNvPr>
+          <p:cNvCxnSpPr>
+            <a:cxnSpLocks/>
+            <a:stCxn id="109" idx="3"/>
+            <a:endCxn id="108" idx="1"/>
+          </p:cNvCxnSpPr>
+          <p:nvPr/>
+        </p:nvCxnSpPr>
+        <p:spPr>
+          <a:xfrm>
+            <a:off x="6521549" y="3254843"/>
+            <a:ext cx="434401" cy="777"/>
+          </a:xfrm>
+          <a:prstGeom prst="bentConnector3">
+            <a:avLst/>
+          </a:prstGeom>
+          <a:ln w="19050">
+            <a:solidFill>
+              <a:srgbClr val="7030A0"/>
+            </a:solidFill>
+            <a:headEnd type="none" w="med" len="med"/>
+            <a:tailEnd type="arrow" w="med" len="med"/>
+          </a:ln>
+          <a:effectLst/>
+        </p:spPr>
+        <p:style>
+          <a:lnRef idx="1">
+            <a:schemeClr val="accent2"/>
+          </a:lnRef>
+          <a:fillRef idx="2">
+            <a:schemeClr val="accent2"/>
+          </a:fillRef>
+          <a:effectRef idx="1">
+            <a:schemeClr val="accent2"/>
+          </a:effectRef>
+          <a:fontRef idx="minor">
+            <a:schemeClr val="dk1"/>
+          </a:fontRef>
+        </p:style>
+      </p:cxnSp>
+      <p:sp>
+        <p:nvSpPr>
+          <p:cNvPr id="111" name="TextBox 110">
+            <a:extLst>
+              <a:ext uri="{FF2B5EF4-FFF2-40B4-BE49-F238E27FC236}">
+                <a16:creationId xmlns:a16="http://schemas.microsoft.com/office/drawing/2014/main" id="{0666F932-93E3-4527-9AA1-D29C0D7CC681}"/>
+              </a:ext>
+            </a:extLst>
+          </p:cNvPr>
           <p:cNvSpPr txBox="1"/>
           <p:nvPr/>
         </p:nvSpPr>
         <p:spPr>
-          <a:xfrm rot="16200000">
-            <a:off x="6527512" y="3586305"/>
-            <a:ext cx="881018" cy="261610"/>
+          <a:xfrm>
+            <a:off x="6777530" y="3322091"/>
+            <a:ext cx="189257" cy="178683"/>
           </a:xfrm>
           <a:prstGeom prst="rect">
             <a:avLst/>
@@ -5257,19 +6980,19 @@
           <a:noFill/>
         </p:spPr>
         <p:txBody>
-          <a:bodyPr wrap="square" rtlCol="0">
-            <a:spAutoFit/>
+          <a:bodyPr wrap="square" lIns="0" tIns="0" rIns="0" bIns="0" rtlCol="0">
+            <a:noAutofit/>
           </a:bodyPr>
           <a:lstStyle/>
           <a:p>
-            <a:pPr algn="r"/>
-            <a:r>
-              <a:rPr lang="en-US" sz="1100" dirty="0" smtClean="0">
+            <a:pPr algn="ctr"/>
+            <a:r>
+              <a:rPr lang="en-US" sz="1100" dirty="0">
                 <a:solidFill>
                   <a:srgbClr val="7030A0"/>
                 </a:solidFill>
               </a:rPr>
-              <a:t>filtered list</a:t>
+              <a:t>*</a:t>
             </a:r>
             <a:endParaRPr lang="en-SG" sz="1100" dirty="0">
               <a:solidFill>
@@ -5279,16 +7002,71 @@
           </a:p>
         </p:txBody>
       </p:sp>
-      <p:sp>
-        <p:nvSpPr>
-          <p:cNvPr id="122" name="Rectangle 8"/>
+      <p:cxnSp>
+        <p:nvCxnSpPr>
+          <p:cNvPr id="112" name="Elbow Connector 58">
+            <a:extLst>
+              <a:ext uri="{FF2B5EF4-FFF2-40B4-BE49-F238E27FC236}">
+                <a16:creationId xmlns:a16="http://schemas.microsoft.com/office/drawing/2014/main" id="{AB65AFF1-5B1E-41AF-8014-EA55304BEFC2}"/>
+              </a:ext>
+            </a:extLst>
+          </p:cNvPr>
+          <p:cNvCxnSpPr>
+            <a:cxnSpLocks/>
+            <a:stCxn id="103" idx="3"/>
+          </p:cNvCxnSpPr>
+          <p:nvPr/>
+        </p:nvCxnSpPr>
+        <p:spPr>
+          <a:xfrm>
+            <a:off x="3938449" y="3253991"/>
+            <a:ext cx="774856" cy="538724"/>
+          </a:xfrm>
+          <a:prstGeom prst="bentConnector3">
+            <a:avLst>
+              <a:gd name="adj1" fmla="val 50000"/>
+            </a:avLst>
+          </a:prstGeom>
+          <a:ln w="19050">
+            <a:solidFill>
+              <a:srgbClr val="7030A0"/>
+            </a:solidFill>
+            <a:headEnd type="none" w="med" len="med"/>
+            <a:tailEnd type="arrow" w="med" len="med"/>
+          </a:ln>
+          <a:effectLst/>
+        </p:spPr>
+        <p:style>
+          <a:lnRef idx="1">
+            <a:schemeClr val="accent2"/>
+          </a:lnRef>
+          <a:fillRef idx="2">
+            <a:schemeClr val="accent2"/>
+          </a:fillRef>
+          <a:effectRef idx="1">
+            <a:schemeClr val="accent2"/>
+          </a:effectRef>
+          <a:fontRef idx="minor">
+            <a:schemeClr val="dk1"/>
+          </a:fontRef>
+        </p:style>
+      </p:cxnSp>
+      <p:sp>
+        <p:nvSpPr>
+          <p:cNvPr id="113" name="Rectangle 8">
+            <a:extLst>
+              <a:ext uri="{FF2B5EF4-FFF2-40B4-BE49-F238E27FC236}">
+                <a16:creationId xmlns:a16="http://schemas.microsoft.com/office/drawing/2014/main" id="{58200865-2BB8-4D33-A518-7D5BF2AD8088}"/>
+              </a:ext>
+            </a:extLst>
+          </p:cNvPr>
           <p:cNvSpPr/>
           <p:nvPr/>
         </p:nvSpPr>
         <p:spPr>
           <a:xfrm>
-            <a:off x="2057401" y="4239491"/>
-            <a:ext cx="1066800" cy="346760"/>
+            <a:off x="4713305" y="3619262"/>
+            <a:ext cx="779190" cy="353752"/>
           </a:xfrm>
           <a:prstGeom prst="rect">
             <a:avLst/>
@@ -5320,35 +7098,12 @@
           <a:p>
             <a:pPr algn="ctr"/>
             <a:r>
-              <a:rPr lang="en-US" sz="1050" dirty="0" smtClean="0">
+              <a:rPr lang="en-US" sz="1050" dirty="0">
                 <a:solidFill>
                   <a:srgbClr val="7030A0"/>
                 </a:solidFill>
               </a:rPr>
-              <a:t>&lt;&lt;interface&gt;&gt;</a:t>
-            </a:r>
-            <a:r>
-              <a:rPr lang="en-US" sz="1050">
-                <a:solidFill>
-                  <a:srgbClr val="7030A0"/>
-                </a:solidFill>
-              </a:rPr>
-              <a:t/>
-            </a:r>
-            <a:br>
-              <a:rPr lang="en-US" sz="1050">
-                <a:solidFill>
-                  <a:srgbClr val="7030A0"/>
-                </a:solidFill>
-              </a:rPr>
-            </a:br>
-            <a:r>
-              <a:rPr lang="en-US" sz="1050" dirty="0" err="1" smtClean="0">
-                <a:solidFill>
-                  <a:srgbClr val="7030A0"/>
-                </a:solidFill>
-              </a:rPr>
-              <a:t>ObservableList</a:t>
+              <a:t>Calendar</a:t>
             </a:r>
             <a:endParaRPr lang="en-SG" sz="1050" dirty="0">
               <a:solidFill>
@@ -5358,98 +7113,21 @@
           </a:p>
         </p:txBody>
       </p:sp>
-      <p:cxnSp>
-        <p:nvCxnSpPr>
-          <p:cNvPr id="124" name="Elbow Connector 122"/>
-          <p:cNvCxnSpPr>
-            <a:stCxn id="119" idx="1"/>
-            <a:endCxn id="122" idx="1"/>
-          </p:cNvCxnSpPr>
-          <p:nvPr/>
-        </p:nvCxnSpPr>
-        <p:spPr>
-          <a:xfrm rot="16200000" flipH="1">
-            <a:off x="1364475" y="3719944"/>
-            <a:ext cx="831471" cy="554381"/>
-          </a:xfrm>
-          <a:prstGeom prst="bentConnector2">
-            <a:avLst/>
-          </a:prstGeom>
-          <a:ln w="19050">
-            <a:solidFill>
-              <a:srgbClr val="7030A0"/>
-            </a:solidFill>
-            <a:prstDash val="sysDot"/>
-            <a:headEnd type="none" w="med" len="med"/>
-            <a:tailEnd type="arrow" w="med" len="med"/>
-          </a:ln>
-          <a:effectLst/>
-        </p:spPr>
-        <p:style>
-          <a:lnRef idx="1">
-            <a:schemeClr val="accent2"/>
-          </a:lnRef>
-          <a:fillRef idx="2">
-            <a:schemeClr val="accent2"/>
-          </a:fillRef>
-          <a:effectRef idx="1">
-            <a:schemeClr val="accent2"/>
-          </a:effectRef>
-          <a:fontRef idx="minor">
-            <a:schemeClr val="dk1"/>
-          </a:fontRef>
-        </p:style>
-      </p:cxnSp>
-      <p:cxnSp>
-        <p:nvCxnSpPr>
-          <p:cNvPr id="50" name="Elbow Connector 49"/>
-          <p:cNvCxnSpPr>
-            <a:stCxn id="62" idx="0"/>
-            <a:endCxn id="57" idx="3"/>
-          </p:cNvCxnSpPr>
-          <p:nvPr/>
-        </p:nvCxnSpPr>
-        <p:spPr>
-          <a:xfrm rot="16200000" flipV="1">
-            <a:off x="5948976" y="2139271"/>
-            <a:ext cx="404117" cy="1033473"/>
-          </a:xfrm>
-          <a:prstGeom prst="bentConnector2">
-            <a:avLst/>
-          </a:prstGeom>
-          <a:ln w="19050">
-            <a:solidFill>
-              <a:srgbClr val="7030A0"/>
-            </a:solidFill>
-            <a:headEnd type="none" w="med" len="med"/>
-            <a:tailEnd type="arrow" w="med" len="med"/>
-          </a:ln>
-          <a:effectLst/>
-        </p:spPr>
-        <p:style>
-          <a:lnRef idx="1">
-            <a:schemeClr val="accent2"/>
-          </a:lnRef>
-          <a:fillRef idx="2">
-            <a:schemeClr val="accent2"/>
-          </a:fillRef>
-          <a:effectRef idx="1">
-            <a:schemeClr val="accent2"/>
-          </a:effectRef>
-          <a:fontRef idx="minor">
-            <a:schemeClr val="dk1"/>
-          </a:fontRef>
-        </p:style>
-      </p:cxnSp>
-      <p:sp>
-        <p:nvSpPr>
-          <p:cNvPr id="11" name="TextBox 10"/>
+      <p:sp>
+        <p:nvSpPr>
+          <p:cNvPr id="115" name="TextBox 114">
+            <a:extLst>
+              <a:ext uri="{FF2B5EF4-FFF2-40B4-BE49-F238E27FC236}">
+                <a16:creationId xmlns:a16="http://schemas.microsoft.com/office/drawing/2014/main" id="{E06B19A6-8756-4237-9729-63B80B0AB81A}"/>
+              </a:ext>
+            </a:extLst>
+          </p:cNvPr>
           <p:cNvSpPr txBox="1"/>
           <p:nvPr/>
         </p:nvSpPr>
         <p:spPr>
           <a:xfrm>
-            <a:off x="4324972" y="2191228"/>
+            <a:off x="4486321" y="3632181"/>
             <a:ext cx="189257" cy="178683"/>
           </a:xfrm>
           <a:prstGeom prst="rect">
@@ -5465,280 +7143,7 @@
           <a:p>
             <a:pPr algn="ctr"/>
             <a:r>
-              <a:rPr lang="en-US" sz="1100" dirty="0" smtClean="0">
-                <a:solidFill>
-                  <a:srgbClr val="7030A0"/>
-                </a:solidFill>
-              </a:rPr>
-              <a:t>1</a:t>
-            </a:r>
-            <a:endParaRPr lang="en-SG" sz="1100" dirty="0">
-              <a:solidFill>
-                <a:srgbClr val="7030A0"/>
-              </a:solidFill>
-            </a:endParaRPr>
-          </a:p>
-        </p:txBody>
-      </p:sp>
-      <p:sp>
-        <p:nvSpPr>
-          <p:cNvPr id="54" name="TextBox 53"/>
-          <p:cNvSpPr txBox="1"/>
-          <p:nvPr/>
-        </p:nvSpPr>
-        <p:spPr>
-          <a:xfrm>
-            <a:off x="4324972" y="3058864"/>
-            <a:ext cx="189257" cy="178683"/>
-          </a:xfrm>
-          <a:prstGeom prst="rect">
-            <a:avLst/>
-          </a:prstGeom>
-          <a:noFill/>
-        </p:spPr>
-        <p:txBody>
-          <a:bodyPr wrap="square" lIns="0" tIns="0" rIns="0" bIns="0" rtlCol="0">
-            <a:noAutofit/>
-          </a:bodyPr>
-          <a:lstStyle/>
-          <a:p>
-            <a:pPr algn="ctr"/>
-            <a:r>
-              <a:rPr lang="en-US" sz="1100" dirty="0" smtClean="0">
-                <a:solidFill>
-                  <a:srgbClr val="7030A0"/>
-                </a:solidFill>
-              </a:rPr>
-              <a:t>1</a:t>
-            </a:r>
-            <a:endParaRPr lang="en-SG" sz="1100" dirty="0">
-              <a:solidFill>
-                <a:srgbClr val="7030A0"/>
-              </a:solidFill>
-            </a:endParaRPr>
-          </a:p>
-        </p:txBody>
-      </p:sp>
-      <p:sp>
-        <p:nvSpPr>
-          <p:cNvPr id="56" name="TextBox 55"/>
-          <p:cNvSpPr txBox="1"/>
-          <p:nvPr/>
-        </p:nvSpPr>
-        <p:spPr>
-          <a:xfrm>
-            <a:off x="5689761" y="2495413"/>
-            <a:ext cx="189257" cy="178683"/>
-          </a:xfrm>
-          <a:prstGeom prst="rect">
-            <a:avLst/>
-          </a:prstGeom>
-          <a:noFill/>
-        </p:spPr>
-        <p:txBody>
-          <a:bodyPr wrap="square" lIns="0" tIns="0" rIns="0" bIns="0" rtlCol="0">
-            <a:noAutofit/>
-          </a:bodyPr>
-          <a:lstStyle/>
-          <a:p>
-            <a:pPr algn="ctr"/>
-            <a:r>
-              <a:rPr lang="en-US" sz="1100" dirty="0" smtClean="0">
-                <a:solidFill>
-                  <a:srgbClr val="7030A0"/>
-                </a:solidFill>
-              </a:rPr>
-              <a:t>1</a:t>
-            </a:r>
-            <a:endParaRPr lang="en-SG" sz="1100" dirty="0">
-              <a:solidFill>
-                <a:srgbClr val="7030A0"/>
-              </a:solidFill>
-            </a:endParaRPr>
-          </a:p>
-        </p:txBody>
-      </p:sp>
-      <p:sp>
-        <p:nvSpPr>
-          <p:cNvPr id="60" name="TextBox 59"/>
-          <p:cNvSpPr txBox="1"/>
-          <p:nvPr/>
-        </p:nvSpPr>
-        <p:spPr>
-          <a:xfrm>
-            <a:off x="5163172" y="1778919"/>
-            <a:ext cx="189257" cy="178683"/>
-          </a:xfrm>
-          <a:prstGeom prst="rect">
-            <a:avLst/>
-          </a:prstGeom>
-          <a:noFill/>
-        </p:spPr>
-        <p:txBody>
-          <a:bodyPr wrap="square" lIns="0" tIns="0" rIns="0" bIns="0" rtlCol="0">
-            <a:noAutofit/>
-          </a:bodyPr>
-          <a:lstStyle/>
-          <a:p>
-            <a:pPr algn="ctr"/>
-            <a:r>
-              <a:rPr lang="en-US" sz="1100" dirty="0" smtClean="0">
-                <a:solidFill>
-                  <a:srgbClr val="7030A0"/>
-                </a:solidFill>
-              </a:rPr>
-              <a:t>*</a:t>
-            </a:r>
-            <a:endParaRPr lang="en-SG" sz="1100" dirty="0">
-              <a:solidFill>
-                <a:srgbClr val="7030A0"/>
-              </a:solidFill>
-            </a:endParaRPr>
-          </a:p>
-        </p:txBody>
-      </p:sp>
-      <p:sp>
-        <p:nvSpPr>
-          <p:cNvPr id="61" name="TextBox 60"/>
-          <p:cNvSpPr txBox="1"/>
-          <p:nvPr/>
-        </p:nvSpPr>
-        <p:spPr>
-          <a:xfrm>
-            <a:off x="6135256" y="3097917"/>
-            <a:ext cx="189257" cy="178683"/>
-          </a:xfrm>
-          <a:prstGeom prst="rect">
-            <a:avLst/>
-          </a:prstGeom>
-          <a:noFill/>
-        </p:spPr>
-        <p:txBody>
-          <a:bodyPr wrap="square" lIns="0" tIns="0" rIns="0" bIns="0" rtlCol="0">
-            <a:noAutofit/>
-          </a:bodyPr>
-          <a:lstStyle/>
-          <a:p>
-            <a:pPr algn="ctr"/>
-            <a:r>
-              <a:rPr lang="en-US" sz="1100" dirty="0" smtClean="0">
-                <a:solidFill>
-                  <a:srgbClr val="7030A0"/>
-                </a:solidFill>
-              </a:rPr>
-              <a:t>*</a:t>
-            </a:r>
-            <a:endParaRPr lang="en-SG" sz="1100" dirty="0">
-              <a:solidFill>
-                <a:srgbClr val="7030A0"/>
-              </a:solidFill>
-            </a:endParaRPr>
-          </a:p>
-        </p:txBody>
-      </p:sp>
-      <p:sp>
-        <p:nvSpPr>
-          <p:cNvPr id="65" name="TextBox 64"/>
-          <p:cNvSpPr txBox="1"/>
-          <p:nvPr/>
-        </p:nvSpPr>
-        <p:spPr>
-          <a:xfrm>
-            <a:off x="2687923" y="2564238"/>
-            <a:ext cx="189257" cy="178683"/>
-          </a:xfrm>
-          <a:prstGeom prst="rect">
-            <a:avLst/>
-          </a:prstGeom>
-          <a:noFill/>
-        </p:spPr>
-        <p:txBody>
-          <a:bodyPr wrap="square" lIns="0" tIns="0" rIns="0" bIns="0" rtlCol="0">
-            <a:noAutofit/>
-          </a:bodyPr>
-          <a:lstStyle/>
-          <a:p>
-            <a:pPr algn="ctr"/>
-            <a:r>
-              <a:rPr lang="en-US" sz="1100" dirty="0" smtClean="0">
-                <a:solidFill>
-                  <a:srgbClr val="7030A0"/>
-                </a:solidFill>
-              </a:rPr>
-              <a:t>1</a:t>
-            </a:r>
-            <a:endParaRPr lang="en-SG" sz="1100" dirty="0">
-              <a:solidFill>
-                <a:srgbClr val="7030A0"/>
-              </a:solidFill>
-            </a:endParaRPr>
-          </a:p>
-        </p:txBody>
-      </p:sp>
-      <p:sp>
-        <p:nvSpPr>
-          <p:cNvPr id="66" name="TextBox 65"/>
-          <p:cNvSpPr txBox="1"/>
-          <p:nvPr/>
-        </p:nvSpPr>
-        <p:spPr>
-          <a:xfrm>
-            <a:off x="2656370" y="3386050"/>
-            <a:ext cx="189257" cy="178683"/>
-          </a:xfrm>
-          <a:prstGeom prst="rect">
-            <a:avLst/>
-          </a:prstGeom>
-          <a:noFill/>
-        </p:spPr>
-        <p:txBody>
-          <a:bodyPr wrap="square" lIns="0" tIns="0" rIns="0" bIns="0" rtlCol="0">
-            <a:noAutofit/>
-          </a:bodyPr>
-          <a:lstStyle/>
-          <a:p>
-            <a:pPr algn="ctr"/>
-            <a:r>
-              <a:rPr lang="en-US" sz="1100" dirty="0" smtClean="0">
-                <a:solidFill>
-                  <a:srgbClr val="7030A0"/>
-                </a:solidFill>
-              </a:rPr>
-              <a:t>1</a:t>
-            </a:r>
-            <a:endParaRPr lang="en-SG" sz="1100" dirty="0">
-              <a:solidFill>
-                <a:srgbClr val="7030A0"/>
-              </a:solidFill>
-            </a:endParaRPr>
-          </a:p>
-        </p:txBody>
-      </p:sp>
-      <p:sp>
-        <p:nvSpPr>
-          <p:cNvPr id="70" name="TextBox 69"/>
-          <p:cNvSpPr txBox="1"/>
-          <p:nvPr/>
-        </p:nvSpPr>
-        <p:spPr>
-          <a:xfrm>
-            <a:off x="6667770" y="3210194"/>
-            <a:ext cx="189257" cy="178683"/>
-          </a:xfrm>
-          <a:prstGeom prst="rect">
-            <a:avLst/>
-          </a:prstGeom>
-          <a:noFill/>
-        </p:spPr>
-        <p:txBody>
-          <a:bodyPr wrap="square" lIns="0" tIns="0" rIns="0" bIns="0" rtlCol="0">
-            <a:noAutofit/>
-          </a:bodyPr>
-          <a:lstStyle/>
-          <a:p>
-            <a:pPr algn="ctr"/>
-            <a:r>
-              <a:rPr lang="en-US" sz="1100" dirty="0" smtClean="0">
+              <a:rPr lang="en-US" sz="1100" dirty="0">
                 <a:solidFill>
                   <a:srgbClr val="7030A0"/>
                 </a:solidFill>
@@ -5763,13 +7168,6 @@
   <p:clrMapOvr>
     <a:masterClrMapping/>
   </p:clrMapOvr>
-  <p:timing>
-    <p:tnLst>
-      <p:par>
-        <p:cTn id="1" dur="indefinite" restart="never" nodeType="tmRoot"/>
-      </p:par>
-    </p:tnLst>
-  </p:timing>
 </p:sld>
 </file>
 

</xml_diff>